<commit_message>
#688 #689 #690 #691 #692 #693 #694 #695 #696 #697 #698 #699 #700 #701 #702 #703 #704 #705 #706 #707 #708 #709 클래스 디자인 작성
</commit_message>
<xml_diff>
--- a/doc/3_ 설계서/Class Design.pptx
+++ b/doc/3_ 설계서/Class Design.pptx
@@ -5,15 +5,17 @@
     <p:sldMasterId id="2147483655" r:id="rId1"/>
   </p:sldMasterIdLst>
   <p:notesMasterIdLst>
-    <p:notesMasterId r:id="rId5"/>
+    <p:notesMasterId r:id="rId7"/>
   </p:notesMasterIdLst>
   <p:handoutMasterIdLst>
-    <p:handoutMasterId r:id="rId6"/>
+    <p:handoutMasterId r:id="rId8"/>
   </p:handoutMasterIdLst>
   <p:sldIdLst>
     <p:sldId id="256" r:id="rId2"/>
     <p:sldId id="257" r:id="rId3"/>
     <p:sldId id="258" r:id="rId4"/>
+    <p:sldId id="259" r:id="rId5"/>
+    <p:sldId id="260" r:id="rId6"/>
   </p:sldIdLst>
   <p:sldSz cx="9144000" cy="6858000" type="screen4x3"/>
   <p:notesSz cx="6797675" cy="9928225"/>
@@ -3092,7 +3094,7 @@
             <p:ph idx="1"/>
             <p:extLst>
               <p:ext uri="{D42A27DB-BD31-4B8C-83A1-F6EECF244321}">
-                <p14:modId xmlns:p14="http://schemas.microsoft.com/office/powerpoint/2010/main" val="3721839066"/>
+                <p14:modId xmlns:p14="http://schemas.microsoft.com/office/powerpoint/2010/main" val="386089614"/>
               </p:ext>
             </p:extLst>
           </p:nvPr>
@@ -3242,6 +3244,16 @@
                     <a:lstStyle/>
                     <a:p>
                       <a:pPr algn="ctr" latinLnBrk="1"/>
+                      <a:r>
+                        <a:rPr lang="en-US" altLang="ko-KR" sz="1200" b="0" dirty="0" smtClean="0">
+                          <a:solidFill>
+                            <a:schemeClr val="tx1"/>
+                          </a:solidFill>
+                          <a:latin typeface="맑은 고딕" pitchFamily="50" charset="-127"/>
+                          <a:ea typeface="맑은 고딕" pitchFamily="50" charset="-127"/>
+                        </a:rPr>
+                        <a:t>17.05.26</a:t>
+                      </a:r>
                       <a:endParaRPr lang="ko-KR" altLang="en-US" sz="1200" b="0" dirty="0">
                         <a:solidFill>
                           <a:schemeClr val="tx1"/>
@@ -3263,6 +3275,16 @@
                     <a:lstStyle/>
                     <a:p>
                       <a:pPr algn="ctr" latinLnBrk="1"/>
+                      <a:r>
+                        <a:rPr lang="en-US" altLang="ko-KR" sz="1200" b="0" dirty="0" smtClean="0">
+                          <a:solidFill>
+                            <a:schemeClr val="tx1"/>
+                          </a:solidFill>
+                          <a:latin typeface="맑은 고딕" pitchFamily="50" charset="-127"/>
+                          <a:ea typeface="맑은 고딕" pitchFamily="50" charset="-127"/>
+                        </a:rPr>
+                        <a:t>V0.1</a:t>
+                      </a:r>
                       <a:endParaRPr lang="ko-KR" altLang="en-US" sz="1200" b="0" dirty="0">
                         <a:solidFill>
                           <a:schemeClr val="tx1"/>
@@ -3284,6 +3306,16 @@
                     <a:lstStyle/>
                     <a:p>
                       <a:pPr latinLnBrk="1"/>
+                      <a:r>
+                        <a:rPr lang="ko-KR" altLang="en-US" sz="1200" b="0" dirty="0" smtClean="0">
+                          <a:solidFill>
+                            <a:schemeClr val="tx1"/>
+                          </a:solidFill>
+                          <a:latin typeface="맑은 고딕" pitchFamily="50" charset="-127"/>
+                          <a:ea typeface="맑은 고딕" pitchFamily="50" charset="-127"/>
+                        </a:rPr>
+                        <a:t>클래스 다이어그램 작성</a:t>
+                      </a:r>
                       <a:endParaRPr lang="ko-KR" altLang="en-US" sz="1200" b="0" dirty="0">
                         <a:solidFill>
                           <a:schemeClr val="tx1"/>
@@ -3305,6 +3337,16 @@
                     <a:lstStyle/>
                     <a:p>
                       <a:pPr algn="ctr" latinLnBrk="1"/>
+                      <a:r>
+                        <a:rPr lang="ko-KR" altLang="en-US" sz="1200" b="0" dirty="0" smtClean="0">
+                          <a:solidFill>
+                            <a:schemeClr val="tx1"/>
+                          </a:solidFill>
+                          <a:latin typeface="맑은 고딕" pitchFamily="50" charset="-127"/>
+                          <a:ea typeface="맑은 고딕" pitchFamily="50" charset="-127"/>
+                        </a:rPr>
+                        <a:t>김상규</a:t>
+                      </a:r>
                       <a:endParaRPr lang="ko-KR" altLang="en-US" sz="1200" b="0" dirty="0">
                         <a:solidFill>
                           <a:schemeClr val="tx1"/>
@@ -3892,52 +3934,178 @@
       </p:sp>
       <p:sp>
         <p:nvSpPr>
-          <p:cNvPr id="24" name="TextBox 23"/>
-          <p:cNvSpPr txBox="1"/>
+          <p:cNvPr id="3" name="직사각형 2"/>
+          <p:cNvSpPr/>
           <p:nvPr/>
         </p:nvSpPr>
-        <p:spPr>
+        <p:spPr bwMode="auto">
           <a:xfrm>
-            <a:off x="914400" y="931659"/>
-            <a:ext cx="752129" cy="307777"/>
+            <a:off x="6948264" y="476672"/>
+            <a:ext cx="1338470" cy="159027"/>
           </a:xfrm>
           <a:prstGeom prst="rect">
             <a:avLst/>
           </a:prstGeom>
-          <a:noFill/>
+          <a:solidFill>
+            <a:schemeClr val="bg1"/>
+          </a:solidFill>
+          <a:ln w="12700" cap="flat" cmpd="sng" algn="ctr">
+            <a:noFill/>
+            <a:prstDash val="solid"/>
+            <a:round/>
+            <a:headEnd type="none" w="med" len="med"/>
+            <a:tailEnd type="none" w="med" len="med"/>
+          </a:ln>
+          <a:effectLst/>
         </p:spPr>
         <p:txBody>
-          <a:bodyPr wrap="none" rtlCol="0">
-            <a:spAutoFit/>
+          <a:bodyPr vert="horz" wrap="none" lIns="90000" tIns="46800" rIns="90000" bIns="46800" numCol="1" rtlCol="0" anchor="ctr" anchorCtr="0" compatLnSpc="1">
+            <a:prstTxWarp prst="textNoShape">
+              <a:avLst/>
+            </a:prstTxWarp>
           </a:bodyPr>
           <a:lstStyle/>
           <a:p>
+            <a:pPr marL="0" marR="0" indent="0" algn="l" defTabSz="914400" rtl="0" eaLnBrk="0" fontAlgn="base" latinLnBrk="0" hangingPunct="0">
+              <a:lnSpc>
+                <a:spcPct val="100000"/>
+              </a:lnSpc>
+              <a:spcBef>
+                <a:spcPct val="0"/>
+              </a:spcBef>
+              <a:spcAft>
+                <a:spcPct val="0"/>
+              </a:spcAft>
+              <a:buClrTx/>
+              <a:buSzTx/>
+              <a:buFontTx/>
+              <a:buNone/>
+              <a:tabLst/>
+            </a:pPr>
             <a:r>
               <a:rPr lang="en-US" altLang="ko-KR" dirty="0" smtClean="0"/>
-              <a:t>&lt;</a:t>
+              <a:t>V 0.1</a:t>
+            </a:r>
+            <a:endParaRPr kumimoji="0" lang="ko-KR" altLang="en-US" sz="1400" b="0" i="0" u="none" strike="noStrike" cap="none" normalizeH="0" baseline="0" dirty="0" smtClean="0">
+              <a:ln>
+                <a:noFill/>
+              </a:ln>
+              <a:solidFill>
+                <a:schemeClr val="tx1"/>
+              </a:solidFill>
+              <a:effectLst/>
+              <a:latin typeface="Arial" charset="0"/>
+              <a:ea typeface="HY울릉도M" pitchFamily="18" charset="-127"/>
+            </a:endParaRPr>
+          </a:p>
+        </p:txBody>
+      </p:sp>
+      <p:sp>
+        <p:nvSpPr>
+          <p:cNvPr id="8" name="직사각형 7"/>
+          <p:cNvSpPr/>
+          <p:nvPr/>
+        </p:nvSpPr>
+        <p:spPr bwMode="auto">
+          <a:xfrm>
+            <a:off x="2266121" y="321366"/>
+            <a:ext cx="1338470" cy="165652"/>
+          </a:xfrm>
+          <a:prstGeom prst="rect">
+            <a:avLst/>
+          </a:prstGeom>
+          <a:noFill/>
+          <a:ln w="12700" cap="flat" cmpd="sng" algn="ctr">
+            <a:noFill/>
+            <a:prstDash val="solid"/>
+            <a:round/>
+            <a:headEnd type="none" w="med" len="med"/>
+            <a:tailEnd type="none" w="med" len="med"/>
+          </a:ln>
+          <a:effectLst/>
+        </p:spPr>
+        <p:txBody>
+          <a:bodyPr vert="horz" wrap="none" lIns="90000" tIns="46800" rIns="90000" bIns="46800" numCol="1" rtlCol="0" anchor="ctr" anchorCtr="0" compatLnSpc="1">
+            <a:prstTxWarp prst="textNoShape">
+              <a:avLst/>
+            </a:prstTxWarp>
+          </a:bodyPr>
+          <a:lstStyle/>
+          <a:p>
+            <a:pPr marL="0" marR="0" indent="0" algn="l" defTabSz="914400" rtl="0" eaLnBrk="0" fontAlgn="base" latinLnBrk="0" hangingPunct="0">
+              <a:lnSpc>
+                <a:spcPct val="100000"/>
+              </a:lnSpc>
+              <a:spcBef>
+                <a:spcPct val="0"/>
+              </a:spcBef>
+              <a:spcAft>
+                <a:spcPct val="0"/>
+              </a:spcAft>
+              <a:buClrTx/>
+              <a:buSzTx/>
+              <a:buFontTx/>
+              <a:buNone/>
+              <a:tabLst/>
+            </a:pPr>
+            <a:r>
+              <a:rPr kumimoji="0" lang="en-US" altLang="ko-KR" sz="1400" b="0" i="0" u="none" strike="noStrike" cap="none" normalizeH="0" baseline="0" dirty="0" smtClean="0">
+                <a:ln>
+                  <a:noFill/>
+                </a:ln>
+                <a:solidFill>
+                  <a:schemeClr val="tx1"/>
+                </a:solidFill>
+                <a:effectLst/>
+                <a:latin typeface="Arial" charset="0"/>
+                <a:ea typeface="HY울릉도M" pitchFamily="18" charset="-127"/>
+              </a:rPr>
+              <a:t>To do</a:t>
             </a:r>
             <a:r>
-              <a:rPr lang="ko-KR" altLang="en-US" dirty="0" smtClean="0"/>
-              <a:t>예시</a:t>
+              <a:rPr kumimoji="0" lang="en-US" altLang="ko-KR" sz="1400" b="0" i="0" u="none" strike="noStrike" cap="none" normalizeH="0" dirty="0" smtClean="0">
+                <a:ln>
+                  <a:noFill/>
+                </a:ln>
+                <a:solidFill>
+                  <a:schemeClr val="tx1"/>
+                </a:solidFill>
+                <a:effectLst/>
+                <a:latin typeface="Arial" charset="0"/>
+                <a:ea typeface="HY울릉도M" pitchFamily="18" charset="-127"/>
+              </a:rPr>
+              <a:t> list</a:t>
             </a:r>
-            <a:r>
-              <a:rPr lang="en-US" altLang="ko-KR" dirty="0" smtClean="0"/>
-              <a:t>&gt;</a:t>
-            </a:r>
-            <a:endParaRPr lang="ko-KR" altLang="en-US" dirty="0"/>
+            <a:endParaRPr kumimoji="0" lang="ko-KR" altLang="en-US" sz="1400" b="0" i="0" u="none" strike="noStrike" cap="none" normalizeH="0" baseline="0" dirty="0" smtClean="0">
+              <a:ln>
+                <a:noFill/>
+              </a:ln>
+              <a:solidFill>
+                <a:schemeClr val="tx1"/>
+              </a:solidFill>
+              <a:effectLst/>
+              <a:latin typeface="Arial" charset="0"/>
+              <a:ea typeface="HY울릉도M" pitchFamily="18" charset="-127"/>
+            </a:endParaRPr>
           </a:p>
         </p:txBody>
       </p:sp>
       <p:pic>
         <p:nvPicPr>
-          <p:cNvPr id="25" name="Picture 3"/>
+          <p:cNvPr id="9" name="Picture 4" descr="C:\Users\Administrator\Desktop\캡쳐\4.JPG"/>
           <p:cNvPicPr>
             <a:picLocks noChangeAspect="1" noChangeArrowheads="1"/>
           </p:cNvPicPr>
           <p:nvPr/>
         </p:nvPicPr>
         <p:blipFill>
-          <a:blip r:embed="rId2" cstate="print"/>
+          <a:blip r:embed="rId2">
+            <a:extLst>
+              <a:ext uri="{28A0092B-C50C-407E-A947-70E740481C1C}">
+                <a14:useLocalDpi xmlns:a14="http://schemas.microsoft.com/office/drawing/2010/main" val="0"/>
+              </a:ext>
+            </a:extLst>
+          </a:blip>
           <a:srcRect/>
           <a:stretch>
             <a:fillRect/>
@@ -3945,23 +4113,2497 @@
         </p:blipFill>
         <p:spPr bwMode="auto">
           <a:xfrm>
-            <a:off x="1146106" y="1806652"/>
-            <a:ext cx="7058326" cy="1290231"/>
+            <a:off x="3139085" y="1316498"/>
+            <a:ext cx="2514600" cy="3409950"/>
           </a:xfrm>
           <a:prstGeom prst="rect">
             <a:avLst/>
           </a:prstGeom>
           <a:noFill/>
-          <a:ln w="9525">
+          <a:extLst>
+            <a:ext uri="{909E8E84-426E-40DD-AFC4-6F175D3DCCD1}">
+              <a14:hiddenFill xmlns:a14="http://schemas.microsoft.com/office/drawing/2010/main">
+                <a:solidFill>
+                  <a:srgbClr val="FFFFFF"/>
+                </a:solidFill>
+              </a14:hiddenFill>
+            </a:ext>
+          </a:extLst>
+        </p:spPr>
+      </p:pic>
+      <p:pic>
+        <p:nvPicPr>
+          <p:cNvPr id="10" name="Picture 5" descr="C:\Users\Administrator\Desktop\캡쳐\2.JPG"/>
+          <p:cNvPicPr>
+            <a:picLocks noChangeAspect="1" noChangeArrowheads="1"/>
+          </p:cNvPicPr>
+          <p:nvPr/>
+        </p:nvPicPr>
+        <p:blipFill>
+          <a:blip r:embed="rId3">
+            <a:extLst>
+              <a:ext uri="{28A0092B-C50C-407E-A947-70E740481C1C}">
+                <a14:useLocalDpi xmlns:a14="http://schemas.microsoft.com/office/drawing/2010/main" val="0"/>
+              </a:ext>
+            </a:extLst>
+          </a:blip>
+          <a:srcRect/>
+          <a:stretch>
+            <a:fillRect/>
+          </a:stretch>
+        </p:blipFill>
+        <p:spPr bwMode="auto">
+          <a:xfrm>
+            <a:off x="6630364" y="2577282"/>
+            <a:ext cx="2138729" cy="885825"/>
+          </a:xfrm>
+          <a:prstGeom prst="rect">
+            <a:avLst/>
+          </a:prstGeom>
+          <a:noFill/>
+          <a:extLst>
+            <a:ext uri="{909E8E84-426E-40DD-AFC4-6F175D3DCCD1}">
+              <a14:hiddenFill xmlns:a14="http://schemas.microsoft.com/office/drawing/2010/main">
+                <a:solidFill>
+                  <a:srgbClr val="FFFFFF"/>
+                </a:solidFill>
+              </a14:hiddenFill>
+            </a:ext>
+          </a:extLst>
+        </p:spPr>
+      </p:pic>
+      <p:pic>
+        <p:nvPicPr>
+          <p:cNvPr id="11" name="Picture 6" descr="C:\Users\Administrator\Desktop\캡쳐\3.JPG"/>
+          <p:cNvPicPr>
+            <a:picLocks noChangeAspect="1" noChangeArrowheads="1"/>
+          </p:cNvPicPr>
+          <p:nvPr/>
+        </p:nvPicPr>
+        <p:blipFill>
+          <a:blip r:embed="rId4">
+            <a:extLst>
+              <a:ext uri="{28A0092B-C50C-407E-A947-70E740481C1C}">
+                <a14:useLocalDpi xmlns:a14="http://schemas.microsoft.com/office/drawing/2010/main" val="0"/>
+              </a:ext>
+            </a:extLst>
+          </a:blip>
+          <a:srcRect/>
+          <a:stretch>
+            <a:fillRect/>
+          </a:stretch>
+        </p:blipFill>
+        <p:spPr bwMode="auto">
+          <a:xfrm>
+            <a:off x="6606918" y="3766943"/>
+            <a:ext cx="2162175" cy="942975"/>
+          </a:xfrm>
+          <a:prstGeom prst="rect">
+            <a:avLst/>
+          </a:prstGeom>
+          <a:noFill/>
+          <a:extLst>
+            <a:ext uri="{909E8E84-426E-40DD-AFC4-6F175D3DCCD1}">
+              <a14:hiddenFill xmlns:a14="http://schemas.microsoft.com/office/drawing/2010/main">
+                <a:solidFill>
+                  <a:srgbClr val="FFFFFF"/>
+                </a:solidFill>
+              </a14:hiddenFill>
+            </a:ext>
+          </a:extLst>
+        </p:spPr>
+      </p:pic>
+      <p:pic>
+        <p:nvPicPr>
+          <p:cNvPr id="12" name="Picture 7" descr="C:\Users\Administrator\Desktop\캡쳐\1.JPG"/>
+          <p:cNvPicPr>
+            <a:picLocks noChangeAspect="1" noChangeArrowheads="1"/>
+          </p:cNvPicPr>
+          <p:nvPr/>
+        </p:nvPicPr>
+        <p:blipFill>
+          <a:blip r:embed="rId5">
+            <a:extLst>
+              <a:ext uri="{28A0092B-C50C-407E-A947-70E740481C1C}">
+                <a14:useLocalDpi xmlns:a14="http://schemas.microsoft.com/office/drawing/2010/main" val="0"/>
+              </a:ext>
+            </a:extLst>
+          </a:blip>
+          <a:srcRect/>
+          <a:stretch>
+            <a:fillRect/>
+          </a:stretch>
+        </p:blipFill>
+        <p:spPr bwMode="auto">
+          <a:xfrm>
+            <a:off x="6659474" y="1358111"/>
+            <a:ext cx="2286000" cy="714375"/>
+          </a:xfrm>
+          <a:prstGeom prst="rect">
+            <a:avLst/>
+          </a:prstGeom>
+          <a:noFill/>
+          <a:extLst>
+            <a:ext uri="{909E8E84-426E-40DD-AFC4-6F175D3DCCD1}">
+              <a14:hiddenFill xmlns:a14="http://schemas.microsoft.com/office/drawing/2010/main">
+                <a:solidFill>
+                  <a:srgbClr val="FFFFFF"/>
+                </a:solidFill>
+              </a14:hiddenFill>
+            </a:ext>
+          </a:extLst>
+        </p:spPr>
+      </p:pic>
+      <p:cxnSp>
+        <p:nvCxnSpPr>
+          <p:cNvPr id="13" name="직선 연결선 12"/>
+          <p:cNvCxnSpPr/>
+          <p:nvPr/>
+        </p:nvCxnSpPr>
+        <p:spPr>
+          <a:xfrm>
+            <a:off x="2593021" y="3210878"/>
+            <a:ext cx="651715" cy="2172"/>
+          </a:xfrm>
+          <a:prstGeom prst="line">
+            <a:avLst/>
+          </a:prstGeom>
+          <a:ln w="19050" cmpd="sng">
+            <a:solidFill>
+              <a:schemeClr val="tx1"/>
+            </a:solidFill>
+          </a:ln>
+        </p:spPr>
+        <p:style>
+          <a:lnRef idx="1">
+            <a:schemeClr val="accent1"/>
+          </a:lnRef>
+          <a:fillRef idx="0">
+            <a:schemeClr val="accent1"/>
+          </a:fillRef>
+          <a:effectRef idx="0">
+            <a:schemeClr val="accent1"/>
+          </a:effectRef>
+          <a:fontRef idx="minor">
+            <a:schemeClr val="tx1"/>
+          </a:fontRef>
+        </p:style>
+      </p:cxnSp>
+      <p:cxnSp>
+        <p:nvCxnSpPr>
+          <p:cNvPr id="14" name="직선 연결선 13"/>
+          <p:cNvCxnSpPr/>
+          <p:nvPr/>
+        </p:nvCxnSpPr>
+        <p:spPr>
+          <a:xfrm>
+            <a:off x="6403531" y="4238433"/>
+            <a:ext cx="319013" cy="0"/>
+          </a:xfrm>
+          <a:prstGeom prst="line">
+            <a:avLst/>
+          </a:prstGeom>
+          <a:ln w="19050" cmpd="sng">
+            <a:solidFill>
+              <a:schemeClr val="tx1"/>
+            </a:solidFill>
+          </a:ln>
+        </p:spPr>
+        <p:style>
+          <a:lnRef idx="1">
+            <a:schemeClr val="accent1"/>
+          </a:lnRef>
+          <a:fillRef idx="0">
+            <a:schemeClr val="accent1"/>
+          </a:fillRef>
+          <a:effectRef idx="0">
+            <a:schemeClr val="accent1"/>
+          </a:effectRef>
+          <a:fontRef idx="minor">
+            <a:schemeClr val="tx1"/>
+          </a:fontRef>
+        </p:style>
+      </p:cxnSp>
+      <p:cxnSp>
+        <p:nvCxnSpPr>
+          <p:cNvPr id="15" name="직선 연결선 14"/>
+          <p:cNvCxnSpPr/>
+          <p:nvPr/>
+        </p:nvCxnSpPr>
+        <p:spPr>
+          <a:xfrm>
+            <a:off x="6403531" y="1715299"/>
+            <a:ext cx="319013" cy="0"/>
+          </a:xfrm>
+          <a:prstGeom prst="line">
+            <a:avLst/>
+          </a:prstGeom>
+          <a:ln w="19050" cmpd="sng">
+            <a:solidFill>
+              <a:schemeClr val="tx1"/>
+            </a:solidFill>
+          </a:ln>
+        </p:spPr>
+        <p:style>
+          <a:lnRef idx="1">
+            <a:schemeClr val="accent1"/>
+          </a:lnRef>
+          <a:fillRef idx="0">
+            <a:schemeClr val="accent1"/>
+          </a:fillRef>
+          <a:effectRef idx="0">
+            <a:schemeClr val="accent1"/>
+          </a:effectRef>
+          <a:fontRef idx="minor">
+            <a:schemeClr val="tx1"/>
+          </a:fontRef>
+        </p:style>
+      </p:cxnSp>
+      <p:cxnSp>
+        <p:nvCxnSpPr>
+          <p:cNvPr id="16" name="직선 연결선 15"/>
+          <p:cNvCxnSpPr/>
+          <p:nvPr/>
+        </p:nvCxnSpPr>
+        <p:spPr>
+          <a:xfrm>
+            <a:off x="6403531" y="1715298"/>
+            <a:ext cx="0" cy="2523135"/>
+          </a:xfrm>
+          <a:prstGeom prst="line">
+            <a:avLst/>
+          </a:prstGeom>
+          <a:ln w="19050" cmpd="sng">
+            <a:solidFill>
+              <a:schemeClr val="tx1"/>
+            </a:solidFill>
+          </a:ln>
+        </p:spPr>
+        <p:style>
+          <a:lnRef idx="1">
+            <a:schemeClr val="accent1"/>
+          </a:lnRef>
+          <a:fillRef idx="0">
+            <a:schemeClr val="accent1"/>
+          </a:fillRef>
+          <a:effectRef idx="0">
+            <a:schemeClr val="accent1"/>
+          </a:effectRef>
+          <a:fontRef idx="minor">
+            <a:schemeClr val="tx1"/>
+          </a:fontRef>
+        </p:style>
+      </p:cxnSp>
+      <p:sp>
+        <p:nvSpPr>
+          <p:cNvPr id="17" name="직각 삼각형 16"/>
+          <p:cNvSpPr/>
+          <p:nvPr/>
+        </p:nvSpPr>
+        <p:spPr>
+          <a:xfrm rot="2700000">
+            <a:off x="2449005" y="3065434"/>
+            <a:ext cx="288032" cy="290885"/>
+          </a:xfrm>
+          <a:prstGeom prst="rtTriangle">
+            <a:avLst/>
+          </a:prstGeom>
+          <a:noFill/>
+          <a:ln w="12700" cmpd="sng">
+            <a:solidFill>
+              <a:schemeClr val="tx1"/>
+            </a:solidFill>
+          </a:ln>
+        </p:spPr>
+        <p:style>
+          <a:lnRef idx="2">
+            <a:schemeClr val="accent1">
+              <a:shade val="50000"/>
+            </a:schemeClr>
+          </a:lnRef>
+          <a:fillRef idx="1">
+            <a:schemeClr val="accent1"/>
+          </a:fillRef>
+          <a:effectRef idx="0">
+            <a:schemeClr val="accent1"/>
+          </a:effectRef>
+          <a:fontRef idx="minor">
+            <a:schemeClr val="lt1"/>
+          </a:fontRef>
+        </p:style>
+        <p:txBody>
+          <a:bodyPr rtlCol="0" anchor="ctr"/>
+          <a:lstStyle/>
+          <a:p>
+            <a:pPr algn="ctr"/>
+            <a:endParaRPr lang="ko-KR" altLang="en-US"/>
+          </a:p>
+        </p:txBody>
+      </p:sp>
+      <p:cxnSp>
+        <p:nvCxnSpPr>
+          <p:cNvPr id="18" name="직선 연결선 17"/>
+          <p:cNvCxnSpPr/>
+          <p:nvPr/>
+        </p:nvCxnSpPr>
+        <p:spPr>
+          <a:xfrm>
+            <a:off x="5728733" y="3033097"/>
+            <a:ext cx="990986" cy="29195"/>
+          </a:xfrm>
+          <a:prstGeom prst="line">
+            <a:avLst/>
+          </a:prstGeom>
+          <a:ln w="19050" cmpd="sng">
+            <a:solidFill>
+              <a:schemeClr val="tx1"/>
+            </a:solidFill>
+          </a:ln>
+        </p:spPr>
+        <p:style>
+          <a:lnRef idx="1">
+            <a:schemeClr val="accent1"/>
+          </a:lnRef>
+          <a:fillRef idx="0">
+            <a:schemeClr val="accent1"/>
+          </a:fillRef>
+          <a:effectRef idx="0">
+            <a:schemeClr val="accent1"/>
+          </a:effectRef>
+          <a:fontRef idx="minor">
+            <a:schemeClr val="tx1"/>
+          </a:fontRef>
+        </p:style>
+      </p:cxnSp>
+      <p:sp>
+        <p:nvSpPr>
+          <p:cNvPr id="19" name="직각 삼각형 18"/>
+          <p:cNvSpPr/>
+          <p:nvPr/>
+        </p:nvSpPr>
+        <p:spPr>
+          <a:xfrm rot="2700000">
+            <a:off x="5584717" y="2887653"/>
+            <a:ext cx="288032" cy="290885"/>
+          </a:xfrm>
+          <a:prstGeom prst="rtTriangle">
+            <a:avLst/>
+          </a:prstGeom>
+          <a:noFill/>
+          <a:ln w="12700" cmpd="sng">
+            <a:solidFill>
+              <a:schemeClr val="tx1"/>
+            </a:solidFill>
+          </a:ln>
+        </p:spPr>
+        <p:style>
+          <a:lnRef idx="2">
+            <a:schemeClr val="accent1">
+              <a:shade val="50000"/>
+            </a:schemeClr>
+          </a:lnRef>
+          <a:fillRef idx="1">
+            <a:schemeClr val="accent1"/>
+          </a:fillRef>
+          <a:effectRef idx="0">
+            <a:schemeClr val="accent1"/>
+          </a:effectRef>
+          <a:fontRef idx="minor">
+            <a:schemeClr val="lt1"/>
+          </a:fontRef>
+        </p:style>
+        <p:txBody>
+          <a:bodyPr rtlCol="0" anchor="ctr"/>
+          <a:lstStyle/>
+          <a:p>
+            <a:pPr algn="ctr"/>
+            <a:endParaRPr lang="ko-KR" altLang="en-US"/>
+          </a:p>
+        </p:txBody>
+      </p:sp>
+      <p:pic>
+        <p:nvPicPr>
+          <p:cNvPr id="20" name="Picture 2" descr="C:\Users\Administrator\Desktop\캡쳐\0.JPG"/>
+          <p:cNvPicPr>
+            <a:picLocks noChangeAspect="1" noChangeArrowheads="1"/>
+          </p:cNvPicPr>
+          <p:nvPr/>
+        </p:nvPicPr>
+        <p:blipFill>
+          <a:blip r:embed="rId6">
+            <a:extLst>
+              <a:ext uri="{28A0092B-C50C-407E-A947-70E740481C1C}">
+                <a14:useLocalDpi xmlns:a14="http://schemas.microsoft.com/office/drawing/2010/main" val="0"/>
+              </a:ext>
+            </a:extLst>
+          </a:blip>
+          <a:srcRect/>
+          <a:stretch>
+            <a:fillRect/>
+          </a:stretch>
+        </p:blipFill>
+        <p:spPr bwMode="auto">
+          <a:xfrm>
+            <a:off x="192429" y="2828417"/>
+            <a:ext cx="2195913" cy="852847"/>
+          </a:xfrm>
+          <a:prstGeom prst="rect">
+            <a:avLst/>
+          </a:prstGeom>
+          <a:noFill/>
+          <a:extLst>
+            <a:ext uri="{909E8E84-426E-40DD-AFC4-6F175D3DCCD1}">
+              <a14:hiddenFill xmlns:a14="http://schemas.microsoft.com/office/drawing/2010/main">
+                <a:solidFill>
+                  <a:srgbClr val="FFFFFF"/>
+                </a:solidFill>
+              </a14:hiddenFill>
+            </a:ext>
+          </a:extLst>
+        </p:spPr>
+      </p:pic>
+    </p:spTree>
+  </p:cSld>
+  <p:clrMapOvr>
+    <a:masterClrMapping/>
+  </p:clrMapOvr>
+</p:sld>
+</file>
+
+<file path=ppt/slides/slide4.xml><?xml version="1.0" encoding="utf-8"?>
+<p:sld xmlns:a="http://schemas.openxmlformats.org/drawingml/2006/main" xmlns:r="http://schemas.openxmlformats.org/officeDocument/2006/relationships" xmlns:p="http://schemas.openxmlformats.org/presentationml/2006/main">
+  <p:cSld>
+    <p:spTree>
+      <p:nvGrpSpPr>
+        <p:cNvPr id="1" name=""/>
+        <p:cNvGrpSpPr/>
+        <p:nvPr/>
+      </p:nvGrpSpPr>
+      <p:grpSpPr>
+        <a:xfrm>
+          <a:off x="0" y="0"/>
+          <a:ext cx="0" cy="0"/>
+          <a:chOff x="0" y="0"/>
+          <a:chExt cx="0" cy="0"/>
+        </a:xfrm>
+      </p:grpSpPr>
+      <p:sp>
+        <p:nvSpPr>
+          <p:cNvPr id="2" name="바닥글 개체 틀 1"/>
+          <p:cNvSpPr>
+            <a:spLocks noGrp="1"/>
+          </p:cNvSpPr>
+          <p:nvPr>
+            <p:ph type="ftr" sz="quarter" idx="3"/>
+          </p:nvPr>
+        </p:nvSpPr>
+        <p:spPr/>
+        <p:txBody>
+          <a:bodyPr/>
+          <a:lstStyle/>
+          <a:p>
+            <a:r>
+              <a:rPr lang="ko-KR" altLang="en-US" smtClean="0"/>
+              <a:t>팀 명</a:t>
+            </a:r>
+            <a:endParaRPr lang="en-US" altLang="ko-KR" dirty="0"/>
+          </a:p>
+        </p:txBody>
+      </p:sp>
+      <p:sp>
+        <p:nvSpPr>
+          <p:cNvPr id="6" name="직사각형 5"/>
+          <p:cNvSpPr/>
+          <p:nvPr/>
+        </p:nvSpPr>
+        <p:spPr bwMode="auto">
+          <a:xfrm>
+            <a:off x="2266121" y="321366"/>
+            <a:ext cx="1338470" cy="165652"/>
+          </a:xfrm>
+          <a:prstGeom prst="rect">
+            <a:avLst/>
+          </a:prstGeom>
+          <a:noFill/>
+          <a:ln w="12700" cap="flat" cmpd="sng" algn="ctr">
             <a:noFill/>
-            <a:miter lim="800000"/>
-            <a:headEnd/>
-            <a:tailEnd/>
+            <a:prstDash val="solid"/>
+            <a:round/>
+            <a:headEnd type="none" w="med" len="med"/>
+            <a:tailEnd type="none" w="med" len="med"/>
           </a:ln>
           <a:effectLst/>
         </p:spPr>
+        <p:txBody>
+          <a:bodyPr vert="horz" wrap="none" lIns="90000" tIns="46800" rIns="90000" bIns="46800" numCol="1" rtlCol="0" anchor="ctr" anchorCtr="0" compatLnSpc="1">
+            <a:prstTxWarp prst="textNoShape">
+              <a:avLst/>
+            </a:prstTxWarp>
+          </a:bodyPr>
+          <a:lstStyle/>
+          <a:p>
+            <a:pPr marL="0" marR="0" indent="0" algn="l" defTabSz="914400" rtl="0" eaLnBrk="0" fontAlgn="base" latinLnBrk="0" hangingPunct="0">
+              <a:lnSpc>
+                <a:spcPct val="100000"/>
+              </a:lnSpc>
+              <a:spcBef>
+                <a:spcPct val="0"/>
+              </a:spcBef>
+              <a:spcAft>
+                <a:spcPct val="0"/>
+              </a:spcAft>
+              <a:buClrTx/>
+              <a:buSzTx/>
+              <a:buFontTx/>
+              <a:buNone/>
+              <a:tabLst/>
+            </a:pPr>
+            <a:r>
+              <a:rPr kumimoji="0" lang="en-US" altLang="ko-KR" sz="1400" b="0" i="0" u="none" strike="noStrike" cap="none" normalizeH="0" baseline="0" dirty="0" smtClean="0">
+                <a:ln>
+                  <a:noFill/>
+                </a:ln>
+                <a:solidFill>
+                  <a:schemeClr val="tx1"/>
+                </a:solidFill>
+                <a:effectLst/>
+                <a:latin typeface="Arial" charset="0"/>
+                <a:ea typeface="HY울릉도M" pitchFamily="18" charset="-127"/>
+              </a:rPr>
+              <a:t>To do</a:t>
+            </a:r>
+            <a:r>
+              <a:rPr kumimoji="0" lang="en-US" altLang="ko-KR" sz="1400" b="0" i="0" u="none" strike="noStrike" cap="none" normalizeH="0" dirty="0" smtClean="0">
+                <a:ln>
+                  <a:noFill/>
+                </a:ln>
+                <a:solidFill>
+                  <a:schemeClr val="tx1"/>
+                </a:solidFill>
+                <a:effectLst/>
+                <a:latin typeface="Arial" charset="0"/>
+                <a:ea typeface="HY울릉도M" pitchFamily="18" charset="-127"/>
+              </a:rPr>
+              <a:t> list</a:t>
+            </a:r>
+            <a:endParaRPr kumimoji="0" lang="ko-KR" altLang="en-US" sz="1400" b="0" i="0" u="none" strike="noStrike" cap="none" normalizeH="0" baseline="0" dirty="0" smtClean="0">
+              <a:ln>
+                <a:noFill/>
+              </a:ln>
+              <a:solidFill>
+                <a:schemeClr val="tx1"/>
+              </a:solidFill>
+              <a:effectLst/>
+              <a:latin typeface="Arial" charset="0"/>
+              <a:ea typeface="HY울릉도M" pitchFamily="18" charset="-127"/>
+            </a:endParaRPr>
+          </a:p>
+        </p:txBody>
+      </p:sp>
+      <p:sp>
+        <p:nvSpPr>
+          <p:cNvPr id="7" name="직사각형 6"/>
+          <p:cNvSpPr/>
+          <p:nvPr/>
+        </p:nvSpPr>
+        <p:spPr bwMode="auto">
+          <a:xfrm>
+            <a:off x="6948264" y="476672"/>
+            <a:ext cx="1338470" cy="159027"/>
+          </a:xfrm>
+          <a:prstGeom prst="rect">
+            <a:avLst/>
+          </a:prstGeom>
+          <a:solidFill>
+            <a:schemeClr val="bg1"/>
+          </a:solidFill>
+          <a:ln w="12700" cap="flat" cmpd="sng" algn="ctr">
+            <a:noFill/>
+            <a:prstDash val="solid"/>
+            <a:round/>
+            <a:headEnd type="none" w="med" len="med"/>
+            <a:tailEnd type="none" w="med" len="med"/>
+          </a:ln>
+          <a:effectLst/>
+        </p:spPr>
+        <p:txBody>
+          <a:bodyPr vert="horz" wrap="none" lIns="90000" tIns="46800" rIns="90000" bIns="46800" numCol="1" rtlCol="0" anchor="ctr" anchorCtr="0" compatLnSpc="1">
+            <a:prstTxWarp prst="textNoShape">
+              <a:avLst/>
+            </a:prstTxWarp>
+          </a:bodyPr>
+          <a:lstStyle/>
+          <a:p>
+            <a:pPr marL="0" marR="0" indent="0" algn="l" defTabSz="914400" rtl="0" eaLnBrk="0" fontAlgn="base" latinLnBrk="0" hangingPunct="0">
+              <a:lnSpc>
+                <a:spcPct val="100000"/>
+              </a:lnSpc>
+              <a:spcBef>
+                <a:spcPct val="0"/>
+              </a:spcBef>
+              <a:spcAft>
+                <a:spcPct val="0"/>
+              </a:spcAft>
+              <a:buClrTx/>
+              <a:buSzTx/>
+              <a:buFontTx/>
+              <a:buNone/>
+              <a:tabLst/>
+            </a:pPr>
+            <a:r>
+              <a:rPr lang="en-US" altLang="ko-KR" dirty="0" smtClean="0"/>
+              <a:t>V 0.1</a:t>
+            </a:r>
+            <a:endParaRPr kumimoji="0" lang="ko-KR" altLang="en-US" sz="1400" b="0" i="0" u="none" strike="noStrike" cap="none" normalizeH="0" baseline="0" dirty="0" smtClean="0">
+              <a:ln>
+                <a:noFill/>
+              </a:ln>
+              <a:solidFill>
+                <a:schemeClr val="tx1"/>
+              </a:solidFill>
+              <a:effectLst/>
+              <a:latin typeface="Arial" charset="0"/>
+              <a:ea typeface="HY울릉도M" pitchFamily="18" charset="-127"/>
+            </a:endParaRPr>
+          </a:p>
+        </p:txBody>
+      </p:sp>
+      <p:pic>
+        <p:nvPicPr>
+          <p:cNvPr id="8" name="Picture 2" descr="C:\Users\Administrator\Desktop\캡쳐\5.JPG"/>
+          <p:cNvPicPr>
+            <a:picLocks noChangeAspect="1" noChangeArrowheads="1"/>
+          </p:cNvPicPr>
+          <p:nvPr/>
+        </p:nvPicPr>
+        <p:blipFill>
+          <a:blip r:embed="rId2">
+            <a:extLst>
+              <a:ext uri="{28A0092B-C50C-407E-A947-70E740481C1C}">
+                <a14:useLocalDpi xmlns:a14="http://schemas.microsoft.com/office/drawing/2010/main" val="0"/>
+              </a:ext>
+            </a:extLst>
+          </a:blip>
+          <a:srcRect/>
+          <a:stretch>
+            <a:fillRect/>
+          </a:stretch>
+        </p:blipFill>
+        <p:spPr bwMode="auto">
+          <a:xfrm>
+            <a:off x="3323181" y="2327386"/>
+            <a:ext cx="2139257" cy="1870967"/>
+          </a:xfrm>
+          <a:prstGeom prst="rect">
+            <a:avLst/>
+          </a:prstGeom>
+          <a:noFill/>
+          <a:extLst>
+            <a:ext uri="{909E8E84-426E-40DD-AFC4-6F175D3DCCD1}">
+              <a14:hiddenFill xmlns:a14="http://schemas.microsoft.com/office/drawing/2010/main">
+                <a:solidFill>
+                  <a:srgbClr val="FFFFFF"/>
+                </a:solidFill>
+              </a14:hiddenFill>
+            </a:ext>
+          </a:extLst>
+        </p:spPr>
+      </p:pic>
+      <p:sp>
+        <p:nvSpPr>
+          <p:cNvPr id="9" name="직각 삼각형 8"/>
+          <p:cNvSpPr/>
+          <p:nvPr/>
+        </p:nvSpPr>
+        <p:spPr>
+          <a:xfrm rot="2700000">
+            <a:off x="5436095" y="3229224"/>
+            <a:ext cx="288032" cy="290885"/>
+          </a:xfrm>
+          <a:prstGeom prst="rtTriangle">
+            <a:avLst/>
+          </a:prstGeom>
+          <a:noFill/>
+          <a:ln w="12700" cmpd="sng">
+            <a:solidFill>
+              <a:schemeClr val="tx1"/>
+            </a:solidFill>
+          </a:ln>
+        </p:spPr>
+        <p:style>
+          <a:lnRef idx="2">
+            <a:schemeClr val="accent1">
+              <a:shade val="50000"/>
+            </a:schemeClr>
+          </a:lnRef>
+          <a:fillRef idx="1">
+            <a:schemeClr val="accent1"/>
+          </a:fillRef>
+          <a:effectRef idx="0">
+            <a:schemeClr val="accent1"/>
+          </a:effectRef>
+          <a:fontRef idx="minor">
+            <a:schemeClr val="lt1"/>
+          </a:fontRef>
+        </p:style>
+        <p:txBody>
+          <a:bodyPr rtlCol="0" anchor="ctr"/>
+          <a:lstStyle/>
+          <a:p>
+            <a:pPr algn="ctr"/>
+            <a:endParaRPr lang="ko-KR" altLang="en-US"/>
+          </a:p>
+        </p:txBody>
+      </p:sp>
+      <p:pic>
+        <p:nvPicPr>
+          <p:cNvPr id="10" name="Picture 3" descr="C:\Users\Administrator\Desktop\캡쳐\6.JPG"/>
+          <p:cNvPicPr>
+            <a:picLocks noChangeAspect="1" noChangeArrowheads="1"/>
+          </p:cNvPicPr>
+          <p:nvPr/>
+        </p:nvPicPr>
+        <p:blipFill>
+          <a:blip r:embed="rId3">
+            <a:extLst>
+              <a:ext uri="{28A0092B-C50C-407E-A947-70E740481C1C}">
+                <a14:useLocalDpi xmlns:a14="http://schemas.microsoft.com/office/drawing/2010/main" val="0"/>
+              </a:ext>
+            </a:extLst>
+          </a:blip>
+          <a:srcRect/>
+          <a:stretch>
+            <a:fillRect/>
+          </a:stretch>
+        </p:blipFill>
+        <p:spPr bwMode="auto">
+          <a:xfrm>
+            <a:off x="6353175" y="3027002"/>
+            <a:ext cx="2507333" cy="695325"/>
+          </a:xfrm>
+          <a:prstGeom prst="rect">
+            <a:avLst/>
+          </a:prstGeom>
+          <a:noFill/>
+          <a:extLst>
+            <a:ext uri="{909E8E84-426E-40DD-AFC4-6F175D3DCCD1}">
+              <a14:hiddenFill xmlns:a14="http://schemas.microsoft.com/office/drawing/2010/main">
+                <a:solidFill>
+                  <a:srgbClr val="FFFFFF"/>
+                </a:solidFill>
+              </a14:hiddenFill>
+            </a:ext>
+          </a:extLst>
+        </p:spPr>
+      </p:pic>
+      <p:cxnSp>
+        <p:nvCxnSpPr>
+          <p:cNvPr id="11" name="직선 연결선 10"/>
+          <p:cNvCxnSpPr/>
+          <p:nvPr/>
+        </p:nvCxnSpPr>
+        <p:spPr>
+          <a:xfrm flipV="1">
+            <a:off x="5580112" y="3374665"/>
+            <a:ext cx="837468" cy="1"/>
+          </a:xfrm>
+          <a:prstGeom prst="line">
+            <a:avLst/>
+          </a:prstGeom>
+          <a:ln w="19050" cmpd="sng">
+            <a:solidFill>
+              <a:schemeClr val="tx1"/>
+            </a:solidFill>
+          </a:ln>
+        </p:spPr>
+        <p:style>
+          <a:lnRef idx="1">
+            <a:schemeClr val="accent1"/>
+          </a:lnRef>
+          <a:fillRef idx="0">
+            <a:schemeClr val="accent1"/>
+          </a:fillRef>
+          <a:effectRef idx="0">
+            <a:schemeClr val="accent1"/>
+          </a:effectRef>
+          <a:fontRef idx="minor">
+            <a:schemeClr val="tx1"/>
+          </a:fontRef>
+        </p:style>
+      </p:cxnSp>
+      <p:sp>
+        <p:nvSpPr>
+          <p:cNvPr id="12" name="직각 삼각형 11"/>
+          <p:cNvSpPr/>
+          <p:nvPr/>
+        </p:nvSpPr>
+        <p:spPr>
+          <a:xfrm rot="2700000">
+            <a:off x="2256398" y="3117428"/>
+            <a:ext cx="288032" cy="290885"/>
+          </a:xfrm>
+          <a:prstGeom prst="rtTriangle">
+            <a:avLst/>
+          </a:prstGeom>
+          <a:noFill/>
+          <a:ln w="12700" cmpd="sng">
+            <a:solidFill>
+              <a:schemeClr val="tx1"/>
+            </a:solidFill>
+          </a:ln>
+        </p:spPr>
+        <p:style>
+          <a:lnRef idx="2">
+            <a:schemeClr val="accent1">
+              <a:shade val="50000"/>
+            </a:schemeClr>
+          </a:lnRef>
+          <a:fillRef idx="1">
+            <a:schemeClr val="accent1"/>
+          </a:fillRef>
+          <a:effectRef idx="0">
+            <a:schemeClr val="accent1"/>
+          </a:effectRef>
+          <a:fontRef idx="minor">
+            <a:schemeClr val="lt1"/>
+          </a:fontRef>
+        </p:style>
+        <p:txBody>
+          <a:bodyPr rtlCol="0" anchor="ctr"/>
+          <a:lstStyle/>
+          <a:p>
+            <a:pPr algn="ctr"/>
+            <a:endParaRPr lang="ko-KR" altLang="en-US"/>
+          </a:p>
+        </p:txBody>
+      </p:sp>
+      <p:cxnSp>
+        <p:nvCxnSpPr>
+          <p:cNvPr id="13" name="직선 연결선 12"/>
+          <p:cNvCxnSpPr/>
+          <p:nvPr/>
+        </p:nvCxnSpPr>
+        <p:spPr>
+          <a:xfrm>
+            <a:off x="2400415" y="3262872"/>
+            <a:ext cx="971435" cy="46705"/>
+          </a:xfrm>
+          <a:prstGeom prst="line">
+            <a:avLst/>
+          </a:prstGeom>
+          <a:ln w="19050" cmpd="sng">
+            <a:solidFill>
+              <a:schemeClr val="tx1"/>
+            </a:solidFill>
+          </a:ln>
+        </p:spPr>
+        <p:style>
+          <a:lnRef idx="1">
+            <a:schemeClr val="accent1"/>
+          </a:lnRef>
+          <a:fillRef idx="0">
+            <a:schemeClr val="accent1"/>
+          </a:fillRef>
+          <a:effectRef idx="0">
+            <a:schemeClr val="accent1"/>
+          </a:effectRef>
+          <a:fontRef idx="minor">
+            <a:schemeClr val="tx1"/>
+          </a:fontRef>
+        </p:style>
+      </p:cxnSp>
+      <p:pic>
+        <p:nvPicPr>
+          <p:cNvPr id="14" name="Picture 2" descr="C:\Users\Administrator\Desktop\캡쳐\0.JPG"/>
+          <p:cNvPicPr>
+            <a:picLocks noChangeAspect="1" noChangeArrowheads="1"/>
+          </p:cNvPicPr>
+          <p:nvPr/>
+        </p:nvPicPr>
+        <p:blipFill>
+          <a:blip r:embed="rId4">
+            <a:extLst>
+              <a:ext uri="{28A0092B-C50C-407E-A947-70E740481C1C}">
+                <a14:useLocalDpi xmlns:a14="http://schemas.microsoft.com/office/drawing/2010/main" val="0"/>
+              </a:ext>
+            </a:extLst>
+          </a:blip>
+          <a:srcRect/>
+          <a:stretch>
+            <a:fillRect/>
+          </a:stretch>
+        </p:blipFill>
+        <p:spPr bwMode="auto">
+          <a:xfrm>
+            <a:off x="278296" y="2966016"/>
+            <a:ext cx="1928842" cy="805713"/>
+          </a:xfrm>
+          <a:prstGeom prst="rect">
+            <a:avLst/>
+          </a:prstGeom>
+          <a:noFill/>
+          <a:extLst>
+            <a:ext uri="{909E8E84-426E-40DD-AFC4-6F175D3DCCD1}">
+              <a14:hiddenFill xmlns:a14="http://schemas.microsoft.com/office/drawing/2010/main">
+                <a:solidFill>
+                  <a:srgbClr val="FFFFFF"/>
+                </a:solidFill>
+              </a14:hiddenFill>
+            </a:ext>
+          </a:extLst>
+        </p:spPr>
       </p:pic>
     </p:spTree>
+    <p:extLst>
+      <p:ext uri="{BB962C8B-B14F-4D97-AF65-F5344CB8AC3E}">
+        <p14:creationId xmlns:p14="http://schemas.microsoft.com/office/powerpoint/2010/main" val="3929297313"/>
+      </p:ext>
+    </p:extLst>
+  </p:cSld>
+  <p:clrMapOvr>
+    <a:masterClrMapping/>
+  </p:clrMapOvr>
+</p:sld>
+</file>
+
+<file path=ppt/slides/slide5.xml><?xml version="1.0" encoding="utf-8"?>
+<p:sld xmlns:a="http://schemas.openxmlformats.org/drawingml/2006/main" xmlns:r="http://schemas.openxmlformats.org/officeDocument/2006/relationships" xmlns:p="http://schemas.openxmlformats.org/presentationml/2006/main">
+  <p:cSld>
+    <p:spTree>
+      <p:nvGrpSpPr>
+        <p:cNvPr id="1" name=""/>
+        <p:cNvGrpSpPr/>
+        <p:nvPr/>
+      </p:nvGrpSpPr>
+      <p:grpSpPr>
+        <a:xfrm>
+          <a:off x="0" y="0"/>
+          <a:ext cx="0" cy="0"/>
+          <a:chOff x="0" y="0"/>
+          <a:chExt cx="0" cy="0"/>
+        </a:xfrm>
+      </p:grpSpPr>
+      <p:sp>
+        <p:nvSpPr>
+          <p:cNvPr id="2" name="바닥글 개체 틀 1"/>
+          <p:cNvSpPr>
+            <a:spLocks noGrp="1"/>
+          </p:cNvSpPr>
+          <p:nvPr>
+            <p:ph type="ftr" sz="quarter" idx="3"/>
+          </p:nvPr>
+        </p:nvSpPr>
+        <p:spPr/>
+        <p:txBody>
+          <a:bodyPr/>
+          <a:lstStyle/>
+          <a:p>
+            <a:pPr algn="r"/>
+            <a:r>
+              <a:rPr lang="ko-KR" altLang="en-US" smtClean="0"/>
+              <a:t>팀 명</a:t>
+            </a:r>
+            <a:endParaRPr lang="en-US" altLang="ko-KR" dirty="0"/>
+          </a:p>
+        </p:txBody>
+      </p:sp>
+      <p:sp>
+        <p:nvSpPr>
+          <p:cNvPr id="3" name="직사각형 2"/>
+          <p:cNvSpPr/>
+          <p:nvPr/>
+        </p:nvSpPr>
+        <p:spPr bwMode="auto">
+          <a:xfrm>
+            <a:off x="2266121" y="321366"/>
+            <a:ext cx="1338470" cy="165652"/>
+          </a:xfrm>
+          <a:prstGeom prst="rect">
+            <a:avLst/>
+          </a:prstGeom>
+          <a:noFill/>
+          <a:ln w="12700" cap="flat" cmpd="sng" algn="ctr">
+            <a:noFill/>
+            <a:prstDash val="solid"/>
+            <a:round/>
+            <a:headEnd type="none" w="med" len="med"/>
+            <a:tailEnd type="none" w="med" len="med"/>
+          </a:ln>
+          <a:effectLst/>
+        </p:spPr>
+        <p:txBody>
+          <a:bodyPr vert="horz" wrap="none" lIns="90000" tIns="46800" rIns="90000" bIns="46800" numCol="1" rtlCol="0" anchor="ctr" anchorCtr="0" compatLnSpc="1">
+            <a:prstTxWarp prst="textNoShape">
+              <a:avLst/>
+            </a:prstTxWarp>
+          </a:bodyPr>
+          <a:lstStyle/>
+          <a:p>
+            <a:pPr marL="0" marR="0" indent="0" algn="l" defTabSz="914400" rtl="0" eaLnBrk="0" fontAlgn="base" latinLnBrk="0" hangingPunct="0">
+              <a:lnSpc>
+                <a:spcPct val="100000"/>
+              </a:lnSpc>
+              <a:spcBef>
+                <a:spcPct val="0"/>
+              </a:spcBef>
+              <a:spcAft>
+                <a:spcPct val="0"/>
+              </a:spcAft>
+              <a:buClrTx/>
+              <a:buSzTx/>
+              <a:buFontTx/>
+              <a:buNone/>
+              <a:tabLst/>
+            </a:pPr>
+            <a:r>
+              <a:rPr kumimoji="0" lang="en-US" altLang="ko-KR" sz="1400" b="0" i="0" u="none" strike="noStrike" cap="none" normalizeH="0" baseline="0" dirty="0" smtClean="0">
+                <a:ln>
+                  <a:noFill/>
+                </a:ln>
+                <a:solidFill>
+                  <a:schemeClr val="tx1"/>
+                </a:solidFill>
+                <a:effectLst/>
+                <a:latin typeface="Arial" charset="0"/>
+                <a:ea typeface="HY울릉도M" pitchFamily="18" charset="-127"/>
+              </a:rPr>
+              <a:t>To do</a:t>
+            </a:r>
+            <a:r>
+              <a:rPr kumimoji="0" lang="en-US" altLang="ko-KR" sz="1400" b="0" i="0" u="none" strike="noStrike" cap="none" normalizeH="0" dirty="0" smtClean="0">
+                <a:ln>
+                  <a:noFill/>
+                </a:ln>
+                <a:solidFill>
+                  <a:schemeClr val="tx1"/>
+                </a:solidFill>
+                <a:effectLst/>
+                <a:latin typeface="Arial" charset="0"/>
+                <a:ea typeface="HY울릉도M" pitchFamily="18" charset="-127"/>
+              </a:rPr>
+              <a:t> list</a:t>
+            </a:r>
+            <a:endParaRPr kumimoji="0" lang="ko-KR" altLang="en-US" sz="1400" b="0" i="0" u="none" strike="noStrike" cap="none" normalizeH="0" baseline="0" dirty="0" smtClean="0">
+              <a:ln>
+                <a:noFill/>
+              </a:ln>
+              <a:solidFill>
+                <a:schemeClr val="tx1"/>
+              </a:solidFill>
+              <a:effectLst/>
+              <a:latin typeface="Arial" charset="0"/>
+              <a:ea typeface="HY울릉도M" pitchFamily="18" charset="-127"/>
+            </a:endParaRPr>
+          </a:p>
+        </p:txBody>
+      </p:sp>
+      <p:sp>
+        <p:nvSpPr>
+          <p:cNvPr id="4" name="직사각형 3"/>
+          <p:cNvSpPr/>
+          <p:nvPr/>
+        </p:nvSpPr>
+        <p:spPr bwMode="auto">
+          <a:xfrm>
+            <a:off x="6948264" y="476672"/>
+            <a:ext cx="1338470" cy="159027"/>
+          </a:xfrm>
+          <a:prstGeom prst="rect">
+            <a:avLst/>
+          </a:prstGeom>
+          <a:solidFill>
+            <a:schemeClr val="bg1"/>
+          </a:solidFill>
+          <a:ln w="12700" cap="flat" cmpd="sng" algn="ctr">
+            <a:noFill/>
+            <a:prstDash val="solid"/>
+            <a:round/>
+            <a:headEnd type="none" w="med" len="med"/>
+            <a:tailEnd type="none" w="med" len="med"/>
+          </a:ln>
+          <a:effectLst/>
+        </p:spPr>
+        <p:txBody>
+          <a:bodyPr vert="horz" wrap="none" lIns="90000" tIns="46800" rIns="90000" bIns="46800" numCol="1" rtlCol="0" anchor="ctr" anchorCtr="0" compatLnSpc="1">
+            <a:prstTxWarp prst="textNoShape">
+              <a:avLst/>
+            </a:prstTxWarp>
+          </a:bodyPr>
+          <a:lstStyle/>
+          <a:p>
+            <a:pPr marL="0" marR="0" indent="0" algn="l" defTabSz="914400" rtl="0" eaLnBrk="0" fontAlgn="base" latinLnBrk="0" hangingPunct="0">
+              <a:lnSpc>
+                <a:spcPct val="100000"/>
+              </a:lnSpc>
+              <a:spcBef>
+                <a:spcPct val="0"/>
+              </a:spcBef>
+              <a:spcAft>
+                <a:spcPct val="0"/>
+              </a:spcAft>
+              <a:buClrTx/>
+              <a:buSzTx/>
+              <a:buFontTx/>
+              <a:buNone/>
+              <a:tabLst/>
+            </a:pPr>
+            <a:r>
+              <a:rPr lang="en-US" altLang="ko-KR" dirty="0" smtClean="0"/>
+              <a:t>V 0.1</a:t>
+            </a:r>
+            <a:endParaRPr kumimoji="0" lang="ko-KR" altLang="en-US" sz="1400" b="0" i="0" u="none" strike="noStrike" cap="none" normalizeH="0" baseline="0" dirty="0" smtClean="0">
+              <a:ln>
+                <a:noFill/>
+              </a:ln>
+              <a:solidFill>
+                <a:schemeClr val="tx1"/>
+              </a:solidFill>
+              <a:effectLst/>
+              <a:latin typeface="Arial" charset="0"/>
+              <a:ea typeface="HY울릉도M" pitchFamily="18" charset="-127"/>
+            </a:endParaRPr>
+          </a:p>
+        </p:txBody>
+      </p:sp>
+      <p:grpSp>
+        <p:nvGrpSpPr>
+          <p:cNvPr id="6" name="그룹 5"/>
+          <p:cNvGrpSpPr/>
+          <p:nvPr/>
+        </p:nvGrpSpPr>
+        <p:grpSpPr>
+          <a:xfrm>
+            <a:off x="2872503" y="881837"/>
+            <a:ext cx="1961900" cy="5215400"/>
+            <a:chOff x="-2408" y="0"/>
+            <a:chExt cx="2866580" cy="6573536"/>
+          </a:xfrm>
+        </p:grpSpPr>
+        <p:pic>
+          <p:nvPicPr>
+            <p:cNvPr id="7" name="Picture 5" descr="C:\Users\Administrator\Desktop\캡쳐\22.JPG"/>
+            <p:cNvPicPr>
+              <a:picLocks noChangeAspect="1" noChangeArrowheads="1"/>
+            </p:cNvPicPr>
+            <p:nvPr/>
+          </p:nvPicPr>
+          <p:blipFill>
+            <a:blip r:embed="rId2" cstate="print">
+              <a:extLst>
+                <a:ext uri="{28A0092B-C50C-407E-A947-70E740481C1C}">
+                  <a14:useLocalDpi xmlns:a14="http://schemas.microsoft.com/office/drawing/2010/main" val="0"/>
+                </a:ext>
+              </a:extLst>
+            </a:blip>
+            <a:srcRect/>
+            <a:stretch>
+              <a:fillRect/>
+            </a:stretch>
+          </p:blipFill>
+          <p:spPr bwMode="auto">
+            <a:xfrm>
+              <a:off x="11029" y="5055885"/>
+              <a:ext cx="2823489" cy="1517651"/>
+            </a:xfrm>
+            <a:prstGeom prst="rect">
+              <a:avLst/>
+            </a:prstGeom>
+            <a:noFill/>
+            <a:extLst>
+              <a:ext uri="{909E8E84-426E-40DD-AFC4-6F175D3DCCD1}">
+                <a14:hiddenFill xmlns:a14="http://schemas.microsoft.com/office/drawing/2010/main">
+                  <a:solidFill>
+                    <a:srgbClr val="FFFFFF"/>
+                  </a:solidFill>
+                </a14:hiddenFill>
+              </a:ext>
+            </a:extLst>
+          </p:spPr>
+        </p:pic>
+        <p:pic>
+          <p:nvPicPr>
+            <p:cNvPr id="8" name="Picture 2" descr="C:\Users\Administrator\Desktop\캡쳐\20.JPG"/>
+            <p:cNvPicPr>
+              <a:picLocks noChangeAspect="1" noChangeArrowheads="1"/>
+            </p:cNvPicPr>
+            <p:nvPr/>
+          </p:nvPicPr>
+          <p:blipFill>
+            <a:blip r:embed="rId3">
+              <a:extLst>
+                <a:ext uri="{28A0092B-C50C-407E-A947-70E740481C1C}">
+                  <a14:useLocalDpi xmlns:a14="http://schemas.microsoft.com/office/drawing/2010/main" val="0"/>
+                </a:ext>
+              </a:extLst>
+            </a:blip>
+            <a:srcRect/>
+            <a:stretch>
+              <a:fillRect/>
+            </a:stretch>
+          </p:blipFill>
+          <p:spPr bwMode="auto">
+            <a:xfrm>
+              <a:off x="6568" y="0"/>
+              <a:ext cx="2837145" cy="2661816"/>
+            </a:xfrm>
+            <a:prstGeom prst="rect">
+              <a:avLst/>
+            </a:prstGeom>
+            <a:noFill/>
+            <a:extLst>
+              <a:ext uri="{909E8E84-426E-40DD-AFC4-6F175D3DCCD1}">
+                <a14:hiddenFill xmlns:a14="http://schemas.microsoft.com/office/drawing/2010/main">
+                  <a:solidFill>
+                    <a:srgbClr val="FFFFFF"/>
+                  </a:solidFill>
+                </a14:hiddenFill>
+              </a:ext>
+            </a:extLst>
+          </p:spPr>
+        </p:pic>
+        <p:pic>
+          <p:nvPicPr>
+            <p:cNvPr id="9" name="Picture 3" descr="C:\Users\Administrator\Desktop\캡쳐\21.JPG"/>
+            <p:cNvPicPr>
+              <a:picLocks noChangeAspect="1" noChangeArrowheads="1"/>
+            </p:cNvPicPr>
+            <p:nvPr/>
+          </p:nvPicPr>
+          <p:blipFill>
+            <a:blip r:embed="rId4" cstate="print">
+              <a:extLst>
+                <a:ext uri="{28A0092B-C50C-407E-A947-70E740481C1C}">
+                  <a14:useLocalDpi xmlns:a14="http://schemas.microsoft.com/office/drawing/2010/main" val="0"/>
+                </a:ext>
+              </a:extLst>
+            </a:blip>
+            <a:srcRect/>
+            <a:stretch>
+              <a:fillRect/>
+            </a:stretch>
+          </p:blipFill>
+          <p:spPr bwMode="auto">
+            <a:xfrm>
+              <a:off x="-2408" y="2661816"/>
+              <a:ext cx="2866580" cy="2407450"/>
+            </a:xfrm>
+            <a:prstGeom prst="rect">
+              <a:avLst/>
+            </a:prstGeom>
+            <a:noFill/>
+            <a:extLst>
+              <a:ext uri="{909E8E84-426E-40DD-AFC4-6F175D3DCCD1}">
+                <a14:hiddenFill xmlns:a14="http://schemas.microsoft.com/office/drawing/2010/main">
+                  <a:solidFill>
+                    <a:srgbClr val="FFFFFF"/>
+                  </a:solidFill>
+                </a14:hiddenFill>
+              </a:ext>
+            </a:extLst>
+          </p:spPr>
+        </p:pic>
+      </p:grpSp>
+      <p:pic>
+        <p:nvPicPr>
+          <p:cNvPr id="5" name="Picture 14" descr="C:\Users\Administrator\Desktop\캡쳐\14.JPG"/>
+          <p:cNvPicPr>
+            <a:picLocks noChangeAspect="1" noChangeArrowheads="1"/>
+          </p:cNvPicPr>
+          <p:nvPr/>
+        </p:nvPicPr>
+        <p:blipFill>
+          <a:blip r:embed="rId5">
+            <a:extLst>
+              <a:ext uri="{28A0092B-C50C-407E-A947-70E740481C1C}">
+                <a14:useLocalDpi xmlns:a14="http://schemas.microsoft.com/office/drawing/2010/main" val="0"/>
+              </a:ext>
+            </a:extLst>
+          </a:blip>
+          <a:srcRect/>
+          <a:stretch>
+            <a:fillRect/>
+          </a:stretch>
+        </p:blipFill>
+        <p:spPr bwMode="auto">
+          <a:xfrm>
+            <a:off x="6805190" y="5784640"/>
+            <a:ext cx="1693221" cy="415045"/>
+          </a:xfrm>
+          <a:prstGeom prst="rect">
+            <a:avLst/>
+          </a:prstGeom>
+          <a:noFill/>
+          <a:extLst>
+            <a:ext uri="{909E8E84-426E-40DD-AFC4-6F175D3DCCD1}">
+              <a14:hiddenFill xmlns:a14="http://schemas.microsoft.com/office/drawing/2010/main">
+                <a:solidFill>
+                  <a:srgbClr val="FFFFFF"/>
+                </a:solidFill>
+              </a14:hiddenFill>
+            </a:ext>
+          </a:extLst>
+        </p:spPr>
+      </p:pic>
+      <p:pic>
+        <p:nvPicPr>
+          <p:cNvPr id="10" name="Picture 6" descr="C:\Users\Administrator\Desktop\캡쳐\6.JPG"/>
+          <p:cNvPicPr>
+            <a:picLocks noChangeAspect="1" noChangeArrowheads="1"/>
+          </p:cNvPicPr>
+          <p:nvPr/>
+        </p:nvPicPr>
+        <p:blipFill>
+          <a:blip r:embed="rId6">
+            <a:extLst>
+              <a:ext uri="{28A0092B-C50C-407E-A947-70E740481C1C}">
+                <a14:useLocalDpi xmlns:a14="http://schemas.microsoft.com/office/drawing/2010/main" val="0"/>
+              </a:ext>
+            </a:extLst>
+          </a:blip>
+          <a:srcRect/>
+          <a:stretch>
+            <a:fillRect/>
+          </a:stretch>
+        </p:blipFill>
+        <p:spPr bwMode="auto">
+          <a:xfrm>
+            <a:off x="6760441" y="4170959"/>
+            <a:ext cx="1858670" cy="484606"/>
+          </a:xfrm>
+          <a:prstGeom prst="rect">
+            <a:avLst/>
+          </a:prstGeom>
+          <a:noFill/>
+          <a:extLst>
+            <a:ext uri="{909E8E84-426E-40DD-AFC4-6F175D3DCCD1}">
+              <a14:hiddenFill xmlns:a14="http://schemas.microsoft.com/office/drawing/2010/main">
+                <a:solidFill>
+                  <a:srgbClr val="FFFFFF"/>
+                </a:solidFill>
+              </a14:hiddenFill>
+            </a:ext>
+          </a:extLst>
+        </p:spPr>
+      </p:pic>
+      <p:pic>
+        <p:nvPicPr>
+          <p:cNvPr id="11" name="Picture 7" descr="C:\Users\Administrator\Desktop\캡쳐\7.JPG"/>
+          <p:cNvPicPr>
+            <a:picLocks noChangeAspect="1" noChangeArrowheads="1"/>
+          </p:cNvPicPr>
+          <p:nvPr/>
+        </p:nvPicPr>
+        <p:blipFill>
+          <a:blip r:embed="rId7" cstate="print">
+            <a:extLst>
+              <a:ext uri="{28A0092B-C50C-407E-A947-70E740481C1C}">
+                <a14:useLocalDpi xmlns:a14="http://schemas.microsoft.com/office/drawing/2010/main" val="0"/>
+              </a:ext>
+            </a:extLst>
+          </a:blip>
+          <a:srcRect/>
+          <a:stretch>
+            <a:fillRect/>
+          </a:stretch>
+        </p:blipFill>
+        <p:spPr bwMode="auto">
+          <a:xfrm>
+            <a:off x="6772433" y="1557597"/>
+            <a:ext cx="1523362" cy="322451"/>
+          </a:xfrm>
+          <a:prstGeom prst="rect">
+            <a:avLst/>
+          </a:prstGeom>
+          <a:noFill/>
+          <a:extLst>
+            <a:ext uri="{909E8E84-426E-40DD-AFC4-6F175D3DCCD1}">
+              <a14:hiddenFill xmlns:a14="http://schemas.microsoft.com/office/drawing/2010/main">
+                <a:solidFill>
+                  <a:srgbClr val="FFFFFF"/>
+                </a:solidFill>
+              </a14:hiddenFill>
+            </a:ext>
+          </a:extLst>
+        </p:spPr>
+      </p:pic>
+      <p:pic>
+        <p:nvPicPr>
+          <p:cNvPr id="12" name="Picture 8" descr="C:\Users\Administrator\Desktop\캡쳐\8.JPG"/>
+          <p:cNvPicPr>
+            <a:picLocks noChangeAspect="1" noChangeArrowheads="1"/>
+          </p:cNvPicPr>
+          <p:nvPr/>
+        </p:nvPicPr>
+        <p:blipFill>
+          <a:blip r:embed="rId8" cstate="print">
+            <a:extLst>
+              <a:ext uri="{28A0092B-C50C-407E-A947-70E740481C1C}">
+                <a14:useLocalDpi xmlns:a14="http://schemas.microsoft.com/office/drawing/2010/main" val="0"/>
+              </a:ext>
+            </a:extLst>
+          </a:blip>
+          <a:srcRect/>
+          <a:stretch>
+            <a:fillRect/>
+          </a:stretch>
+        </p:blipFill>
+        <p:spPr bwMode="auto">
+          <a:xfrm>
+            <a:off x="6771897" y="881837"/>
+            <a:ext cx="1681228" cy="641885"/>
+          </a:xfrm>
+          <a:prstGeom prst="rect">
+            <a:avLst/>
+          </a:prstGeom>
+          <a:noFill/>
+          <a:extLst>
+            <a:ext uri="{909E8E84-426E-40DD-AFC4-6F175D3DCCD1}">
+              <a14:hiddenFill xmlns:a14="http://schemas.microsoft.com/office/drawing/2010/main">
+                <a:solidFill>
+                  <a:srgbClr val="FFFFFF"/>
+                </a:solidFill>
+              </a14:hiddenFill>
+            </a:ext>
+          </a:extLst>
+        </p:spPr>
+      </p:pic>
+      <p:pic>
+        <p:nvPicPr>
+          <p:cNvPr id="13" name="Picture 9" descr="C:\Users\Administrator\Desktop\캡쳐\9.JPG"/>
+          <p:cNvPicPr>
+            <a:picLocks noChangeAspect="1" noChangeArrowheads="1"/>
+          </p:cNvPicPr>
+          <p:nvPr/>
+        </p:nvPicPr>
+        <p:blipFill>
+          <a:blip r:embed="rId9">
+            <a:extLst>
+              <a:ext uri="{28A0092B-C50C-407E-A947-70E740481C1C}">
+                <a14:useLocalDpi xmlns:a14="http://schemas.microsoft.com/office/drawing/2010/main" val="0"/>
+              </a:ext>
+            </a:extLst>
+          </a:blip>
+          <a:srcRect/>
+          <a:stretch>
+            <a:fillRect/>
+          </a:stretch>
+        </p:blipFill>
+        <p:spPr bwMode="auto">
+          <a:xfrm>
+            <a:off x="6806338" y="5441661"/>
+            <a:ext cx="1713479" cy="356464"/>
+          </a:xfrm>
+          <a:prstGeom prst="rect">
+            <a:avLst/>
+          </a:prstGeom>
+          <a:noFill/>
+          <a:extLst>
+            <a:ext uri="{909E8E84-426E-40DD-AFC4-6F175D3DCCD1}">
+              <a14:hiddenFill xmlns:a14="http://schemas.microsoft.com/office/drawing/2010/main">
+                <a:solidFill>
+                  <a:srgbClr val="FFFFFF"/>
+                </a:solidFill>
+              </a14:hiddenFill>
+            </a:ext>
+          </a:extLst>
+        </p:spPr>
+      </p:pic>
+      <p:pic>
+        <p:nvPicPr>
+          <p:cNvPr id="14" name="Picture 10" descr="C:\Users\Administrator\Desktop\캡쳐\10.JPG"/>
+          <p:cNvPicPr>
+            <a:picLocks noChangeAspect="1" noChangeArrowheads="1"/>
+          </p:cNvPicPr>
+          <p:nvPr/>
+        </p:nvPicPr>
+        <p:blipFill>
+          <a:blip r:embed="rId10">
+            <a:extLst>
+              <a:ext uri="{28A0092B-C50C-407E-A947-70E740481C1C}">
+                <a14:useLocalDpi xmlns:a14="http://schemas.microsoft.com/office/drawing/2010/main" val="0"/>
+              </a:ext>
+            </a:extLst>
+          </a:blip>
+          <a:srcRect/>
+          <a:stretch>
+            <a:fillRect/>
+          </a:stretch>
+        </p:blipFill>
+        <p:spPr bwMode="auto">
+          <a:xfrm>
+            <a:off x="6806338" y="5065906"/>
+            <a:ext cx="1658779" cy="375755"/>
+          </a:xfrm>
+          <a:prstGeom prst="rect">
+            <a:avLst/>
+          </a:prstGeom>
+          <a:noFill/>
+          <a:extLst>
+            <a:ext uri="{909E8E84-426E-40DD-AFC4-6F175D3DCCD1}">
+              <a14:hiddenFill xmlns:a14="http://schemas.microsoft.com/office/drawing/2010/main">
+                <a:solidFill>
+                  <a:srgbClr val="FFFFFF"/>
+                </a:solidFill>
+              </a14:hiddenFill>
+            </a:ext>
+          </a:extLst>
+        </p:spPr>
+      </p:pic>
+      <p:pic>
+        <p:nvPicPr>
+          <p:cNvPr id="15" name="Picture 11" descr="C:\Users\Administrator\Desktop\캡쳐\11.JPG"/>
+          <p:cNvPicPr>
+            <a:picLocks noChangeAspect="1" noChangeArrowheads="1"/>
+          </p:cNvPicPr>
+          <p:nvPr/>
+        </p:nvPicPr>
+        <p:blipFill>
+          <a:blip r:embed="rId11">
+            <a:extLst>
+              <a:ext uri="{28A0092B-C50C-407E-A947-70E740481C1C}">
+                <a14:useLocalDpi xmlns:a14="http://schemas.microsoft.com/office/drawing/2010/main" val="0"/>
+              </a:ext>
+            </a:extLst>
+          </a:blip>
+          <a:srcRect/>
+          <a:stretch>
+            <a:fillRect/>
+          </a:stretch>
+        </p:blipFill>
+        <p:spPr bwMode="auto">
+          <a:xfrm>
+            <a:off x="6760441" y="2177061"/>
+            <a:ext cx="1692684" cy="381379"/>
+          </a:xfrm>
+          <a:prstGeom prst="rect">
+            <a:avLst/>
+          </a:prstGeom>
+          <a:noFill/>
+          <a:extLst>
+            <a:ext uri="{909E8E84-426E-40DD-AFC4-6F175D3DCCD1}">
+              <a14:hiddenFill xmlns:a14="http://schemas.microsoft.com/office/drawing/2010/main">
+                <a:solidFill>
+                  <a:srgbClr val="FFFFFF"/>
+                </a:solidFill>
+              </a14:hiddenFill>
+            </a:ext>
+          </a:extLst>
+        </p:spPr>
+      </p:pic>
+      <p:pic>
+        <p:nvPicPr>
+          <p:cNvPr id="16" name="Picture 12" descr="C:\Users\Administrator\Desktop\캡쳐\12.JPG"/>
+          <p:cNvPicPr>
+            <a:picLocks noChangeAspect="1" noChangeArrowheads="1"/>
+          </p:cNvPicPr>
+          <p:nvPr/>
+        </p:nvPicPr>
+        <p:blipFill>
+          <a:blip r:embed="rId12">
+            <a:extLst>
+              <a:ext uri="{28A0092B-C50C-407E-A947-70E740481C1C}">
+                <a14:useLocalDpi xmlns:a14="http://schemas.microsoft.com/office/drawing/2010/main" val="0"/>
+              </a:ext>
+            </a:extLst>
+          </a:blip>
+          <a:srcRect/>
+          <a:stretch>
+            <a:fillRect/>
+          </a:stretch>
+        </p:blipFill>
+        <p:spPr bwMode="auto">
+          <a:xfrm>
+            <a:off x="6770676" y="2558441"/>
+            <a:ext cx="1694442" cy="378427"/>
+          </a:xfrm>
+          <a:prstGeom prst="rect">
+            <a:avLst/>
+          </a:prstGeom>
+          <a:noFill/>
+          <a:extLst>
+            <a:ext uri="{909E8E84-426E-40DD-AFC4-6F175D3DCCD1}">
+              <a14:hiddenFill xmlns:a14="http://schemas.microsoft.com/office/drawing/2010/main">
+                <a:solidFill>
+                  <a:srgbClr val="FFFFFF"/>
+                </a:solidFill>
+              </a14:hiddenFill>
+            </a:ext>
+          </a:extLst>
+        </p:spPr>
+      </p:pic>
+      <p:pic>
+        <p:nvPicPr>
+          <p:cNvPr id="17" name="Picture 13" descr="C:\Users\Administrator\Desktop\캡쳐\13.JPG"/>
+          <p:cNvPicPr>
+            <a:picLocks noChangeAspect="1" noChangeArrowheads="1"/>
+          </p:cNvPicPr>
+          <p:nvPr/>
+        </p:nvPicPr>
+        <p:blipFill>
+          <a:blip r:embed="rId13">
+            <a:extLst>
+              <a:ext uri="{28A0092B-C50C-407E-A947-70E740481C1C}">
+                <a14:useLocalDpi xmlns:a14="http://schemas.microsoft.com/office/drawing/2010/main" val="0"/>
+              </a:ext>
+            </a:extLst>
+          </a:blip>
+          <a:srcRect/>
+          <a:stretch>
+            <a:fillRect/>
+          </a:stretch>
+        </p:blipFill>
+        <p:spPr bwMode="auto">
+          <a:xfrm>
+            <a:off x="6721726" y="3761697"/>
+            <a:ext cx="1856273" cy="409262"/>
+          </a:xfrm>
+          <a:prstGeom prst="rect">
+            <a:avLst/>
+          </a:prstGeom>
+          <a:noFill/>
+          <a:extLst>
+            <a:ext uri="{909E8E84-426E-40DD-AFC4-6F175D3DCCD1}">
+              <a14:hiddenFill xmlns:a14="http://schemas.microsoft.com/office/drawing/2010/main">
+                <a:solidFill>
+                  <a:srgbClr val="FFFFFF"/>
+                </a:solidFill>
+              </a14:hiddenFill>
+            </a:ext>
+          </a:extLst>
+        </p:spPr>
+      </p:pic>
+      <p:pic>
+        <p:nvPicPr>
+          <p:cNvPr id="18" name="Picture 15" descr="C:\Users\Administrator\Desktop\캡쳐\15.JPG"/>
+          <p:cNvPicPr>
+            <a:picLocks noChangeAspect="1" noChangeArrowheads="1"/>
+          </p:cNvPicPr>
+          <p:nvPr/>
+        </p:nvPicPr>
+        <p:blipFill>
+          <a:blip r:embed="rId14">
+            <a:extLst>
+              <a:ext uri="{28A0092B-C50C-407E-A947-70E740481C1C}">
+                <a14:useLocalDpi xmlns:a14="http://schemas.microsoft.com/office/drawing/2010/main" val="0"/>
+              </a:ext>
+            </a:extLst>
+          </a:blip>
+          <a:srcRect/>
+          <a:stretch>
+            <a:fillRect/>
+          </a:stretch>
+        </p:blipFill>
+        <p:spPr bwMode="auto">
+          <a:xfrm>
+            <a:off x="6719380" y="3297683"/>
+            <a:ext cx="1840446" cy="475833"/>
+          </a:xfrm>
+          <a:prstGeom prst="rect">
+            <a:avLst/>
+          </a:prstGeom>
+          <a:noFill/>
+          <a:extLst>
+            <a:ext uri="{909E8E84-426E-40DD-AFC4-6F175D3DCCD1}">
+              <a14:hiddenFill xmlns:a14="http://schemas.microsoft.com/office/drawing/2010/main">
+                <a:solidFill>
+                  <a:srgbClr val="FFFFFF"/>
+                </a:solidFill>
+              </a14:hiddenFill>
+            </a:ext>
+          </a:extLst>
+        </p:spPr>
+      </p:pic>
+      <p:pic>
+        <p:nvPicPr>
+          <p:cNvPr id="19" name="Picture 16" descr="C:\Users\Administrator\Desktop\캡쳐\16.JPG"/>
+          <p:cNvPicPr>
+            <a:picLocks noChangeAspect="1" noChangeArrowheads="1"/>
+          </p:cNvPicPr>
+          <p:nvPr/>
+        </p:nvPicPr>
+        <p:blipFill>
+          <a:blip r:embed="rId15">
+            <a:extLst>
+              <a:ext uri="{28A0092B-C50C-407E-A947-70E740481C1C}">
+                <a14:useLocalDpi xmlns:a14="http://schemas.microsoft.com/office/drawing/2010/main" val="0"/>
+              </a:ext>
+            </a:extLst>
+          </a:blip>
+          <a:srcRect/>
+          <a:stretch>
+            <a:fillRect/>
+          </a:stretch>
+        </p:blipFill>
+        <p:spPr bwMode="auto">
+          <a:xfrm>
+            <a:off x="6772434" y="4655566"/>
+            <a:ext cx="1846677" cy="385352"/>
+          </a:xfrm>
+          <a:prstGeom prst="rect">
+            <a:avLst/>
+          </a:prstGeom>
+          <a:noFill/>
+          <a:extLst>
+            <a:ext uri="{909E8E84-426E-40DD-AFC4-6F175D3DCCD1}">
+              <a14:hiddenFill xmlns:a14="http://schemas.microsoft.com/office/drawing/2010/main">
+                <a:solidFill>
+                  <a:srgbClr val="FFFFFF"/>
+                </a:solidFill>
+              </a14:hiddenFill>
+            </a:ext>
+          </a:extLst>
+        </p:spPr>
+      </p:pic>
+      <p:pic>
+        <p:nvPicPr>
+          <p:cNvPr id="20" name="Picture 17" descr="C:\Users\Administrator\Desktop\캡쳐\17.JPG"/>
+          <p:cNvPicPr>
+            <a:picLocks noChangeAspect="1" noChangeArrowheads="1"/>
+          </p:cNvPicPr>
+          <p:nvPr/>
+        </p:nvPicPr>
+        <p:blipFill>
+          <a:blip r:embed="rId16">
+            <a:extLst>
+              <a:ext uri="{28A0092B-C50C-407E-A947-70E740481C1C}">
+                <a14:useLocalDpi xmlns:a14="http://schemas.microsoft.com/office/drawing/2010/main" val="0"/>
+              </a:ext>
+            </a:extLst>
+          </a:blip>
+          <a:srcRect/>
+          <a:stretch>
+            <a:fillRect/>
+          </a:stretch>
+        </p:blipFill>
+        <p:spPr bwMode="auto">
+          <a:xfrm>
+            <a:off x="6783412" y="1921199"/>
+            <a:ext cx="1336330" cy="299065"/>
+          </a:xfrm>
+          <a:prstGeom prst="rect">
+            <a:avLst/>
+          </a:prstGeom>
+          <a:noFill/>
+          <a:extLst>
+            <a:ext uri="{909E8E84-426E-40DD-AFC4-6F175D3DCCD1}">
+              <a14:hiddenFill xmlns:a14="http://schemas.microsoft.com/office/drawing/2010/main">
+                <a:solidFill>
+                  <a:srgbClr val="FFFFFF"/>
+                </a:solidFill>
+              </a14:hiddenFill>
+            </a:ext>
+          </a:extLst>
+        </p:spPr>
+      </p:pic>
+      <p:pic>
+        <p:nvPicPr>
+          <p:cNvPr id="21" name="Picture 18" descr="C:\Users\Administrator\Desktop\캡쳐\18.JPG"/>
+          <p:cNvPicPr>
+            <a:picLocks noChangeAspect="1" noChangeArrowheads="1"/>
+          </p:cNvPicPr>
+          <p:nvPr/>
+        </p:nvPicPr>
+        <p:blipFill>
+          <a:blip r:embed="rId17">
+            <a:extLst>
+              <a:ext uri="{28A0092B-C50C-407E-A947-70E740481C1C}">
+                <a14:useLocalDpi xmlns:a14="http://schemas.microsoft.com/office/drawing/2010/main" val="0"/>
+              </a:ext>
+            </a:extLst>
+          </a:blip>
+          <a:srcRect/>
+          <a:stretch>
+            <a:fillRect/>
+          </a:stretch>
+        </p:blipFill>
+        <p:spPr bwMode="auto">
+          <a:xfrm>
+            <a:off x="6760442" y="2921736"/>
+            <a:ext cx="1817557" cy="386085"/>
+          </a:xfrm>
+          <a:prstGeom prst="rect">
+            <a:avLst/>
+          </a:prstGeom>
+          <a:noFill/>
+          <a:extLst>
+            <a:ext uri="{909E8E84-426E-40DD-AFC4-6F175D3DCCD1}">
+              <a14:hiddenFill xmlns:a14="http://schemas.microsoft.com/office/drawing/2010/main">
+                <a:solidFill>
+                  <a:srgbClr val="FFFFFF"/>
+                </a:solidFill>
+              </a14:hiddenFill>
+            </a:ext>
+          </a:extLst>
+        </p:spPr>
+      </p:pic>
+      <p:sp>
+        <p:nvSpPr>
+          <p:cNvPr id="22" name="직각 삼각형 21"/>
+          <p:cNvSpPr/>
+          <p:nvPr/>
+        </p:nvSpPr>
+        <p:spPr>
+          <a:xfrm rot="2700000">
+            <a:off x="4830048" y="3411565"/>
+            <a:ext cx="236256" cy="227999"/>
+          </a:xfrm>
+          <a:prstGeom prst="rtTriangle">
+            <a:avLst/>
+          </a:prstGeom>
+          <a:noFill/>
+          <a:ln w="12700" cmpd="sng">
+            <a:solidFill>
+              <a:schemeClr val="tx1"/>
+            </a:solidFill>
+          </a:ln>
+        </p:spPr>
+        <p:style>
+          <a:lnRef idx="2">
+            <a:schemeClr val="accent1">
+              <a:shade val="50000"/>
+            </a:schemeClr>
+          </a:lnRef>
+          <a:fillRef idx="1">
+            <a:schemeClr val="accent1"/>
+          </a:fillRef>
+          <a:effectRef idx="0">
+            <a:schemeClr val="accent1"/>
+          </a:effectRef>
+          <a:fontRef idx="minor">
+            <a:schemeClr val="lt1"/>
+          </a:fontRef>
+        </p:style>
+        <p:txBody>
+          <a:bodyPr rtlCol="0" anchor="ctr"/>
+          <a:lstStyle/>
+          <a:p>
+            <a:pPr algn="ctr"/>
+            <a:endParaRPr lang="ko-KR" altLang="en-US"/>
+          </a:p>
+        </p:txBody>
+      </p:sp>
+      <p:cxnSp>
+        <p:nvCxnSpPr>
+          <p:cNvPr id="23" name="직선 연결선 22"/>
+          <p:cNvCxnSpPr/>
+          <p:nvPr/>
+        </p:nvCxnSpPr>
+        <p:spPr>
+          <a:xfrm flipH="1">
+            <a:off x="6151050" y="1181312"/>
+            <a:ext cx="2394" cy="4810851"/>
+          </a:xfrm>
+          <a:prstGeom prst="line">
+            <a:avLst/>
+          </a:prstGeom>
+          <a:ln w="19050" cmpd="sng">
+            <a:solidFill>
+              <a:schemeClr val="tx1"/>
+            </a:solidFill>
+          </a:ln>
+        </p:spPr>
+        <p:style>
+          <a:lnRef idx="1">
+            <a:schemeClr val="accent1"/>
+          </a:lnRef>
+          <a:fillRef idx="0">
+            <a:schemeClr val="accent1"/>
+          </a:fillRef>
+          <a:effectRef idx="0">
+            <a:schemeClr val="accent1"/>
+          </a:effectRef>
+          <a:fontRef idx="minor">
+            <a:schemeClr val="tx1"/>
+          </a:fontRef>
+        </p:style>
+      </p:cxnSp>
+      <p:cxnSp>
+        <p:nvCxnSpPr>
+          <p:cNvPr id="24" name="직선 연결선 23"/>
+          <p:cNvCxnSpPr/>
+          <p:nvPr/>
+        </p:nvCxnSpPr>
+        <p:spPr>
+          <a:xfrm>
+            <a:off x="6151050" y="1181312"/>
+            <a:ext cx="632363" cy="0"/>
+          </a:xfrm>
+          <a:prstGeom prst="line">
+            <a:avLst/>
+          </a:prstGeom>
+          <a:ln w="19050" cmpd="sng">
+            <a:solidFill>
+              <a:schemeClr val="tx1"/>
+            </a:solidFill>
+          </a:ln>
+        </p:spPr>
+        <p:style>
+          <a:lnRef idx="1">
+            <a:schemeClr val="accent1"/>
+          </a:lnRef>
+          <a:fillRef idx="0">
+            <a:schemeClr val="accent1"/>
+          </a:fillRef>
+          <a:effectRef idx="0">
+            <a:schemeClr val="accent1"/>
+          </a:effectRef>
+          <a:fontRef idx="minor">
+            <a:schemeClr val="tx1"/>
+          </a:fontRef>
+        </p:style>
+      </p:cxnSp>
+      <p:cxnSp>
+        <p:nvCxnSpPr>
+          <p:cNvPr id="25" name="직선 연결선 24"/>
+          <p:cNvCxnSpPr/>
+          <p:nvPr/>
+        </p:nvCxnSpPr>
+        <p:spPr>
+          <a:xfrm>
+            <a:off x="6151050" y="1718822"/>
+            <a:ext cx="641942" cy="0"/>
+          </a:xfrm>
+          <a:prstGeom prst="line">
+            <a:avLst/>
+          </a:prstGeom>
+          <a:ln w="19050" cmpd="sng">
+            <a:solidFill>
+              <a:schemeClr val="tx1"/>
+            </a:solidFill>
+          </a:ln>
+        </p:spPr>
+        <p:style>
+          <a:lnRef idx="1">
+            <a:schemeClr val="accent1"/>
+          </a:lnRef>
+          <a:fillRef idx="0">
+            <a:schemeClr val="accent1"/>
+          </a:fillRef>
+          <a:effectRef idx="0">
+            <a:schemeClr val="accent1"/>
+          </a:effectRef>
+          <a:fontRef idx="minor">
+            <a:schemeClr val="tx1"/>
+          </a:fontRef>
+        </p:style>
+      </p:cxnSp>
+      <p:cxnSp>
+        <p:nvCxnSpPr>
+          <p:cNvPr id="26" name="직선 연결선 25"/>
+          <p:cNvCxnSpPr/>
+          <p:nvPr/>
+        </p:nvCxnSpPr>
+        <p:spPr>
+          <a:xfrm flipV="1">
+            <a:off x="6146259" y="2068336"/>
+            <a:ext cx="658931" cy="2395"/>
+          </a:xfrm>
+          <a:prstGeom prst="line">
+            <a:avLst/>
+          </a:prstGeom>
+          <a:ln w="19050" cmpd="sng">
+            <a:solidFill>
+              <a:schemeClr val="tx1"/>
+            </a:solidFill>
+          </a:ln>
+        </p:spPr>
+        <p:style>
+          <a:lnRef idx="1">
+            <a:schemeClr val="accent1"/>
+          </a:lnRef>
+          <a:fillRef idx="0">
+            <a:schemeClr val="accent1"/>
+          </a:fillRef>
+          <a:effectRef idx="0">
+            <a:schemeClr val="accent1"/>
+          </a:effectRef>
+          <a:fontRef idx="minor">
+            <a:schemeClr val="tx1"/>
+          </a:fontRef>
+        </p:style>
+      </p:cxnSp>
+      <p:cxnSp>
+        <p:nvCxnSpPr>
+          <p:cNvPr id="27" name="직선 연결선 26"/>
+          <p:cNvCxnSpPr/>
+          <p:nvPr/>
+        </p:nvCxnSpPr>
+        <p:spPr>
+          <a:xfrm flipV="1">
+            <a:off x="6146259" y="2742565"/>
+            <a:ext cx="655118" cy="5088"/>
+          </a:xfrm>
+          <a:prstGeom prst="line">
+            <a:avLst/>
+          </a:prstGeom>
+          <a:ln w="19050" cmpd="sng">
+            <a:solidFill>
+              <a:schemeClr val="tx1"/>
+            </a:solidFill>
+          </a:ln>
+        </p:spPr>
+        <p:style>
+          <a:lnRef idx="1">
+            <a:schemeClr val="accent1"/>
+          </a:lnRef>
+          <a:fillRef idx="0">
+            <a:schemeClr val="accent1"/>
+          </a:fillRef>
+          <a:effectRef idx="0">
+            <a:schemeClr val="accent1"/>
+          </a:effectRef>
+          <a:fontRef idx="minor">
+            <a:schemeClr val="tx1"/>
+          </a:fontRef>
+        </p:style>
+      </p:cxnSp>
+      <p:cxnSp>
+        <p:nvCxnSpPr>
+          <p:cNvPr id="28" name="직선 연결선 27"/>
+          <p:cNvCxnSpPr/>
+          <p:nvPr/>
+        </p:nvCxnSpPr>
+        <p:spPr>
+          <a:xfrm>
+            <a:off x="6153443" y="2367750"/>
+            <a:ext cx="637153" cy="1"/>
+          </a:xfrm>
+          <a:prstGeom prst="line">
+            <a:avLst/>
+          </a:prstGeom>
+          <a:ln w="19050" cmpd="sng">
+            <a:solidFill>
+              <a:schemeClr val="tx1"/>
+            </a:solidFill>
+          </a:ln>
+        </p:spPr>
+        <p:style>
+          <a:lnRef idx="1">
+            <a:schemeClr val="accent1"/>
+          </a:lnRef>
+          <a:fillRef idx="0">
+            <a:schemeClr val="accent1"/>
+          </a:fillRef>
+          <a:effectRef idx="0">
+            <a:schemeClr val="accent1"/>
+          </a:effectRef>
+          <a:fontRef idx="minor">
+            <a:schemeClr val="tx1"/>
+          </a:fontRef>
+        </p:style>
+      </p:cxnSp>
+      <p:cxnSp>
+        <p:nvCxnSpPr>
+          <p:cNvPr id="29" name="직선 연결선 28"/>
+          <p:cNvCxnSpPr/>
+          <p:nvPr/>
+        </p:nvCxnSpPr>
+        <p:spPr>
+          <a:xfrm flipV="1">
+            <a:off x="6141798" y="3123811"/>
+            <a:ext cx="655118" cy="5088"/>
+          </a:xfrm>
+          <a:prstGeom prst="line">
+            <a:avLst/>
+          </a:prstGeom>
+          <a:ln w="19050" cmpd="sng">
+            <a:solidFill>
+              <a:schemeClr val="tx1"/>
+            </a:solidFill>
+          </a:ln>
+        </p:spPr>
+        <p:style>
+          <a:lnRef idx="1">
+            <a:schemeClr val="accent1"/>
+          </a:lnRef>
+          <a:fillRef idx="0">
+            <a:schemeClr val="accent1"/>
+          </a:fillRef>
+          <a:effectRef idx="0">
+            <a:schemeClr val="accent1"/>
+          </a:effectRef>
+          <a:fontRef idx="minor">
+            <a:schemeClr val="tx1"/>
+          </a:fontRef>
+        </p:style>
+      </p:cxnSp>
+      <p:cxnSp>
+        <p:nvCxnSpPr>
+          <p:cNvPr id="30" name="직선 연결선 29"/>
+          <p:cNvCxnSpPr>
+            <a:stCxn id="22" idx="5"/>
+          </p:cNvCxnSpPr>
+          <p:nvPr/>
+        </p:nvCxnSpPr>
+        <p:spPr>
+          <a:xfrm>
+            <a:off x="4948176" y="3525565"/>
+            <a:ext cx="1794237" cy="0"/>
+          </a:xfrm>
+          <a:prstGeom prst="line">
+            <a:avLst/>
+          </a:prstGeom>
+          <a:ln w="19050" cmpd="sng">
+            <a:solidFill>
+              <a:schemeClr val="tx1"/>
+            </a:solidFill>
+          </a:ln>
+        </p:spPr>
+        <p:style>
+          <a:lnRef idx="1">
+            <a:schemeClr val="accent1"/>
+          </a:lnRef>
+          <a:fillRef idx="0">
+            <a:schemeClr val="accent1"/>
+          </a:fillRef>
+          <a:effectRef idx="0">
+            <a:schemeClr val="accent1"/>
+          </a:effectRef>
+          <a:fontRef idx="minor">
+            <a:schemeClr val="tx1"/>
+          </a:fontRef>
+        </p:style>
+      </p:cxnSp>
+      <p:cxnSp>
+        <p:nvCxnSpPr>
+          <p:cNvPr id="31" name="직선 연결선 30"/>
+          <p:cNvCxnSpPr/>
+          <p:nvPr/>
+        </p:nvCxnSpPr>
+        <p:spPr>
+          <a:xfrm flipV="1">
+            <a:off x="6146258" y="3991355"/>
+            <a:ext cx="655118" cy="5088"/>
+          </a:xfrm>
+          <a:prstGeom prst="line">
+            <a:avLst/>
+          </a:prstGeom>
+          <a:ln w="19050" cmpd="sng">
+            <a:solidFill>
+              <a:schemeClr val="tx1"/>
+            </a:solidFill>
+          </a:ln>
+        </p:spPr>
+        <p:style>
+          <a:lnRef idx="1">
+            <a:schemeClr val="accent1"/>
+          </a:lnRef>
+          <a:fillRef idx="0">
+            <a:schemeClr val="accent1"/>
+          </a:fillRef>
+          <a:effectRef idx="0">
+            <a:schemeClr val="accent1"/>
+          </a:effectRef>
+          <a:fontRef idx="minor">
+            <a:schemeClr val="tx1"/>
+          </a:fontRef>
+        </p:style>
+      </p:cxnSp>
+      <p:cxnSp>
+        <p:nvCxnSpPr>
+          <p:cNvPr id="32" name="직선 연결선 31"/>
+          <p:cNvCxnSpPr/>
+          <p:nvPr/>
+        </p:nvCxnSpPr>
+        <p:spPr>
+          <a:xfrm flipV="1">
+            <a:off x="6150071" y="4417321"/>
+            <a:ext cx="655118" cy="5088"/>
+          </a:xfrm>
+          <a:prstGeom prst="line">
+            <a:avLst/>
+          </a:prstGeom>
+          <a:ln w="19050" cmpd="sng">
+            <a:solidFill>
+              <a:schemeClr val="tx1"/>
+            </a:solidFill>
+          </a:ln>
+        </p:spPr>
+        <p:style>
+          <a:lnRef idx="1">
+            <a:schemeClr val="accent1"/>
+          </a:lnRef>
+          <a:fillRef idx="0">
+            <a:schemeClr val="accent1"/>
+          </a:fillRef>
+          <a:effectRef idx="0">
+            <a:schemeClr val="accent1"/>
+          </a:effectRef>
+          <a:fontRef idx="minor">
+            <a:schemeClr val="tx1"/>
+          </a:fontRef>
+        </p:style>
+      </p:cxnSp>
+      <p:cxnSp>
+        <p:nvCxnSpPr>
+          <p:cNvPr id="33" name="직선 연결선 32"/>
+          <p:cNvCxnSpPr/>
+          <p:nvPr/>
+        </p:nvCxnSpPr>
+        <p:spPr>
+          <a:xfrm>
+            <a:off x="6153443" y="4849594"/>
+            <a:ext cx="674620" cy="7419"/>
+          </a:xfrm>
+          <a:prstGeom prst="line">
+            <a:avLst/>
+          </a:prstGeom>
+          <a:ln w="19050" cmpd="sng">
+            <a:solidFill>
+              <a:schemeClr val="tx1"/>
+            </a:solidFill>
+          </a:ln>
+        </p:spPr>
+        <p:style>
+          <a:lnRef idx="1">
+            <a:schemeClr val="accent1"/>
+          </a:lnRef>
+          <a:fillRef idx="0">
+            <a:schemeClr val="accent1"/>
+          </a:fillRef>
+          <a:effectRef idx="0">
+            <a:schemeClr val="accent1"/>
+          </a:effectRef>
+          <a:fontRef idx="minor">
+            <a:schemeClr val="tx1"/>
+          </a:fontRef>
+        </p:style>
+      </p:cxnSp>
+      <p:cxnSp>
+        <p:nvCxnSpPr>
+          <p:cNvPr id="34" name="직선 연결선 33"/>
+          <p:cNvCxnSpPr/>
+          <p:nvPr/>
+        </p:nvCxnSpPr>
+        <p:spPr>
+          <a:xfrm>
+            <a:off x="6146258" y="5619893"/>
+            <a:ext cx="674620" cy="7419"/>
+          </a:xfrm>
+          <a:prstGeom prst="line">
+            <a:avLst/>
+          </a:prstGeom>
+          <a:ln w="19050" cmpd="sng">
+            <a:solidFill>
+              <a:schemeClr val="tx1"/>
+            </a:solidFill>
+          </a:ln>
+        </p:spPr>
+        <p:style>
+          <a:lnRef idx="1">
+            <a:schemeClr val="accent1"/>
+          </a:lnRef>
+          <a:fillRef idx="0">
+            <a:schemeClr val="accent1"/>
+          </a:fillRef>
+          <a:effectRef idx="0">
+            <a:schemeClr val="accent1"/>
+          </a:effectRef>
+          <a:fontRef idx="minor">
+            <a:schemeClr val="tx1"/>
+          </a:fontRef>
+        </p:style>
+      </p:cxnSp>
+      <p:cxnSp>
+        <p:nvCxnSpPr>
+          <p:cNvPr id="35" name="직선 연결선 34"/>
+          <p:cNvCxnSpPr/>
+          <p:nvPr/>
+        </p:nvCxnSpPr>
+        <p:spPr>
+          <a:xfrm>
+            <a:off x="6146258" y="5254104"/>
+            <a:ext cx="674620" cy="7419"/>
+          </a:xfrm>
+          <a:prstGeom prst="line">
+            <a:avLst/>
+          </a:prstGeom>
+          <a:ln w="19050" cmpd="sng">
+            <a:solidFill>
+              <a:schemeClr val="tx1"/>
+            </a:solidFill>
+          </a:ln>
+        </p:spPr>
+        <p:style>
+          <a:lnRef idx="1">
+            <a:schemeClr val="accent1"/>
+          </a:lnRef>
+          <a:fillRef idx="0">
+            <a:schemeClr val="accent1"/>
+          </a:fillRef>
+          <a:effectRef idx="0">
+            <a:schemeClr val="accent1"/>
+          </a:effectRef>
+          <a:fontRef idx="minor">
+            <a:schemeClr val="tx1"/>
+          </a:fontRef>
+        </p:style>
+      </p:cxnSp>
+      <p:cxnSp>
+        <p:nvCxnSpPr>
+          <p:cNvPr id="36" name="직선 연결선 35"/>
+          <p:cNvCxnSpPr>
+            <a:endCxn id="5" idx="1"/>
+          </p:cNvCxnSpPr>
+          <p:nvPr/>
+        </p:nvCxnSpPr>
+        <p:spPr>
+          <a:xfrm flipV="1">
+            <a:off x="6150071" y="5992163"/>
+            <a:ext cx="655119" cy="9045"/>
+          </a:xfrm>
+          <a:prstGeom prst="line">
+            <a:avLst/>
+          </a:prstGeom>
+          <a:ln w="19050" cmpd="sng">
+            <a:solidFill>
+              <a:schemeClr val="tx1"/>
+            </a:solidFill>
+          </a:ln>
+        </p:spPr>
+        <p:style>
+          <a:lnRef idx="1">
+            <a:schemeClr val="accent1"/>
+          </a:lnRef>
+          <a:fillRef idx="0">
+            <a:schemeClr val="accent1"/>
+          </a:fillRef>
+          <a:effectRef idx="0">
+            <a:schemeClr val="accent1"/>
+          </a:effectRef>
+          <a:fontRef idx="minor">
+            <a:schemeClr val="tx1"/>
+          </a:fontRef>
+        </p:style>
+      </p:cxnSp>
+      <p:sp>
+        <p:nvSpPr>
+          <p:cNvPr id="37" name="직각 삼각형 36"/>
+          <p:cNvSpPr/>
+          <p:nvPr/>
+        </p:nvSpPr>
+        <p:spPr>
+          <a:xfrm rot="2700000">
+            <a:off x="1628867" y="3310381"/>
+            <a:ext cx="212435" cy="213861"/>
+          </a:xfrm>
+          <a:prstGeom prst="rtTriangle">
+            <a:avLst/>
+          </a:prstGeom>
+          <a:noFill/>
+          <a:ln w="12700" cmpd="sng">
+            <a:solidFill>
+              <a:schemeClr val="tx1"/>
+            </a:solidFill>
+          </a:ln>
+        </p:spPr>
+        <p:style>
+          <a:lnRef idx="2">
+            <a:schemeClr val="accent1">
+              <a:shade val="50000"/>
+            </a:schemeClr>
+          </a:lnRef>
+          <a:fillRef idx="1">
+            <a:schemeClr val="accent1"/>
+          </a:fillRef>
+          <a:effectRef idx="0">
+            <a:schemeClr val="accent1"/>
+          </a:effectRef>
+          <a:fontRef idx="minor">
+            <a:schemeClr val="lt1"/>
+          </a:fontRef>
+        </p:style>
+        <p:txBody>
+          <a:bodyPr rtlCol="0" anchor="ctr"/>
+          <a:lstStyle/>
+          <a:p>
+            <a:pPr algn="ctr"/>
+            <a:endParaRPr lang="ko-KR" altLang="en-US"/>
+          </a:p>
+        </p:txBody>
+      </p:sp>
+      <p:cxnSp>
+        <p:nvCxnSpPr>
+          <p:cNvPr id="38" name="직선 연결선 37"/>
+          <p:cNvCxnSpPr/>
+          <p:nvPr/>
+        </p:nvCxnSpPr>
+        <p:spPr>
+          <a:xfrm flipV="1">
+            <a:off x="1753282" y="3415988"/>
+            <a:ext cx="1068854" cy="17156"/>
+          </a:xfrm>
+          <a:prstGeom prst="line">
+            <a:avLst/>
+          </a:prstGeom>
+          <a:ln w="19050" cmpd="sng">
+            <a:solidFill>
+              <a:schemeClr val="tx1"/>
+            </a:solidFill>
+          </a:ln>
+        </p:spPr>
+        <p:style>
+          <a:lnRef idx="1">
+            <a:schemeClr val="accent1"/>
+          </a:lnRef>
+          <a:fillRef idx="0">
+            <a:schemeClr val="accent1"/>
+          </a:fillRef>
+          <a:effectRef idx="0">
+            <a:schemeClr val="accent1"/>
+          </a:effectRef>
+          <a:fontRef idx="minor">
+            <a:schemeClr val="tx1"/>
+          </a:fontRef>
+        </p:style>
+      </p:cxnSp>
+      <p:pic>
+        <p:nvPicPr>
+          <p:cNvPr id="39" name="Picture 2" descr="C:\Users\Administrator\Desktop\캡쳐\0.JPG"/>
+          <p:cNvPicPr>
+            <a:picLocks noChangeAspect="1" noChangeArrowheads="1"/>
+          </p:cNvPicPr>
+          <p:nvPr/>
+        </p:nvPicPr>
+        <p:blipFill>
+          <a:blip r:embed="rId18">
+            <a:extLst>
+              <a:ext uri="{28A0092B-C50C-407E-A947-70E740481C1C}">
+                <a14:useLocalDpi xmlns:a14="http://schemas.microsoft.com/office/drawing/2010/main" val="0"/>
+              </a:ext>
+            </a:extLst>
+          </a:blip>
+          <a:srcRect/>
+          <a:stretch>
+            <a:fillRect/>
+          </a:stretch>
+        </p:blipFill>
+        <p:spPr bwMode="auto">
+          <a:xfrm>
+            <a:off x="172278" y="3079317"/>
+            <a:ext cx="1398275" cy="635660"/>
+          </a:xfrm>
+          <a:prstGeom prst="rect">
+            <a:avLst/>
+          </a:prstGeom>
+          <a:noFill/>
+          <a:extLst>
+            <a:ext uri="{909E8E84-426E-40DD-AFC4-6F175D3DCCD1}">
+              <a14:hiddenFill xmlns:a14="http://schemas.microsoft.com/office/drawing/2010/main">
+                <a:solidFill>
+                  <a:srgbClr val="FFFFFF"/>
+                </a:solidFill>
+              </a14:hiddenFill>
+            </a:ext>
+          </a:extLst>
+        </p:spPr>
+      </p:pic>
+    </p:spTree>
+    <p:extLst>
+      <p:ext uri="{BB962C8B-B14F-4D97-AF65-F5344CB8AC3E}">
+        <p14:creationId xmlns:p14="http://schemas.microsoft.com/office/powerpoint/2010/main" val="1623619786"/>
+      </p:ext>
+    </p:extLst>
   </p:cSld>
   <p:clrMapOvr>
     <a:masterClrMapping/>

</xml_diff>